<commit_message>
checkckeck läuft das hier
</commit_message>
<xml_diff>
--- a/scratch.pptx
+++ b/scratch.pptx
@@ -5,7 +5,7 @@
     <p:sldMasterId id="2147483648" r:id="rId1"/>
   </p:sldMasterIdLst>
   <p:notesMasterIdLst>
-    <p:notesMasterId r:id="rId11"/>
+    <p:notesMasterId r:id="rId12"/>
   </p:notesMasterIdLst>
   <p:sldIdLst>
     <p:sldId id="256" r:id="rId2"/>
@@ -14,14 +14,15 @@
     <p:sldId id="257" r:id="rId5"/>
     <p:sldId id="258" r:id="rId6"/>
     <p:sldId id="262" r:id="rId7"/>
-    <p:sldId id="264" r:id="rId8"/>
-    <p:sldId id="259" r:id="rId9"/>
-    <p:sldId id="260" r:id="rId10"/>
+    <p:sldId id="265" r:id="rId8"/>
+    <p:sldId id="264" r:id="rId9"/>
+    <p:sldId id="259" r:id="rId10"/>
+    <p:sldId id="260" r:id="rId11"/>
   </p:sldIdLst>
   <p:sldSz cx="12192000" cy="6858000"/>
   <p:notesSz cx="9926638" cy="14352588"/>
   <p:custDataLst>
-    <p:tags r:id="rId12"/>
+    <p:tags r:id="rId13"/>
   </p:custDataLst>
   <p:defaultTextStyle>
     <a:defPPr>
@@ -120,7 +121,18 @@
   </p:defaultTextStyle>
   <p:extLst>
     <p:ext uri="{EFAFB233-063F-42B5-8137-9DF3F51BA10A}">
-      <p15:sldGuideLst xmlns:p15="http://schemas.microsoft.com/office/powerpoint/2012/main"/>
+      <p15:sldGuideLst xmlns:p15="http://schemas.microsoft.com/office/powerpoint/2012/main">
+        <p15:guide id="1" orient="horz" pos="2160" userDrawn="1">
+          <p15:clr>
+            <a:srgbClr val="A4A3A4"/>
+          </p15:clr>
+        </p15:guide>
+        <p15:guide id="2" pos="3840" userDrawn="1">
+          <p15:clr>
+            <a:srgbClr val="A4A3A4"/>
+          </p15:clr>
+        </p15:guide>
+      </p15:sldGuideLst>
     </p:ext>
   </p:extLst>
 </p:presentation>
@@ -34883,7 +34895,7 @@
           <a:p>
             <a:fld id="{ADB3A5E3-9D61-4D7B-8FB1-DFF7E31CD570}" type="datetimeFigureOut">
               <a:rPr lang="de-DE" smtClean="0"/>
-              <a:t>23.05.2023</a:t>
+              <a:t>25.05.2023</a:t>
             </a:fld>
             <a:endParaRPr lang="de-DE"/>
           </a:p>
@@ -35465,7 +35477,7 @@
           <a:p>
             <a:fld id="{C41AF5A7-074E-4464-B39C-B9F232C32D5A}" type="datetimeFigureOut">
               <a:rPr lang="de-DE" smtClean="0"/>
-              <a:t>23.05.2023</a:t>
+              <a:t>25.05.2023</a:t>
             </a:fld>
             <a:endParaRPr lang="de-DE"/>
           </a:p>
@@ -35663,7 +35675,7 @@
           <a:p>
             <a:fld id="{C41AF5A7-074E-4464-B39C-B9F232C32D5A}" type="datetimeFigureOut">
               <a:rPr lang="de-DE" smtClean="0"/>
-              <a:t>23.05.2023</a:t>
+              <a:t>25.05.2023</a:t>
             </a:fld>
             <a:endParaRPr lang="de-DE"/>
           </a:p>
@@ -35871,7 +35883,7 @@
           <a:p>
             <a:fld id="{C41AF5A7-074E-4464-B39C-B9F232C32D5A}" type="datetimeFigureOut">
               <a:rPr lang="de-DE" smtClean="0"/>
-              <a:t>23.05.2023</a:t>
+              <a:t>25.05.2023</a:t>
             </a:fld>
             <a:endParaRPr lang="de-DE"/>
           </a:p>
@@ -36069,7 +36081,7 @@
           <a:p>
             <a:fld id="{C41AF5A7-074E-4464-B39C-B9F232C32D5A}" type="datetimeFigureOut">
               <a:rPr lang="de-DE" smtClean="0"/>
-              <a:t>23.05.2023</a:t>
+              <a:t>25.05.2023</a:t>
             </a:fld>
             <a:endParaRPr lang="de-DE"/>
           </a:p>
@@ -36344,7 +36356,7 @@
           <a:p>
             <a:fld id="{C41AF5A7-074E-4464-B39C-B9F232C32D5A}" type="datetimeFigureOut">
               <a:rPr lang="de-DE" smtClean="0"/>
-              <a:t>23.05.2023</a:t>
+              <a:t>25.05.2023</a:t>
             </a:fld>
             <a:endParaRPr lang="de-DE"/>
           </a:p>
@@ -36609,7 +36621,7 @@
           <a:p>
             <a:fld id="{C41AF5A7-074E-4464-B39C-B9F232C32D5A}" type="datetimeFigureOut">
               <a:rPr lang="de-DE" smtClean="0"/>
-              <a:t>23.05.2023</a:t>
+              <a:t>25.05.2023</a:t>
             </a:fld>
             <a:endParaRPr lang="de-DE"/>
           </a:p>
@@ -37021,7 +37033,7 @@
           <a:p>
             <a:fld id="{C41AF5A7-074E-4464-B39C-B9F232C32D5A}" type="datetimeFigureOut">
               <a:rPr lang="de-DE" smtClean="0"/>
-              <a:t>23.05.2023</a:t>
+              <a:t>25.05.2023</a:t>
             </a:fld>
             <a:endParaRPr lang="de-DE"/>
           </a:p>
@@ -37162,7 +37174,7 @@
           <a:p>
             <a:fld id="{C41AF5A7-074E-4464-B39C-B9F232C32D5A}" type="datetimeFigureOut">
               <a:rPr lang="de-DE" smtClean="0"/>
-              <a:t>23.05.2023</a:t>
+              <a:t>25.05.2023</a:t>
             </a:fld>
             <a:endParaRPr lang="de-DE"/>
           </a:p>
@@ -37275,7 +37287,7 @@
           <a:p>
             <a:fld id="{C41AF5A7-074E-4464-B39C-B9F232C32D5A}" type="datetimeFigureOut">
               <a:rPr lang="de-DE" smtClean="0"/>
-              <a:t>23.05.2023</a:t>
+              <a:t>25.05.2023</a:t>
             </a:fld>
             <a:endParaRPr lang="de-DE"/>
           </a:p>
@@ -37586,7 +37598,7 @@
           <a:p>
             <a:fld id="{C41AF5A7-074E-4464-B39C-B9F232C32D5A}" type="datetimeFigureOut">
               <a:rPr lang="de-DE" smtClean="0"/>
-              <a:t>23.05.2023</a:t>
+              <a:t>25.05.2023</a:t>
             </a:fld>
             <a:endParaRPr lang="de-DE"/>
           </a:p>
@@ -37874,7 +37886,7 @@
           <a:p>
             <a:fld id="{C41AF5A7-074E-4464-B39C-B9F232C32D5A}" type="datetimeFigureOut">
               <a:rPr lang="de-DE" smtClean="0"/>
-              <a:t>23.05.2023</a:t>
+              <a:t>25.05.2023</a:t>
             </a:fld>
             <a:endParaRPr lang="de-DE"/>
           </a:p>
@@ -38115,7 +38127,7 @@
           <a:p>
             <a:fld id="{C41AF5A7-074E-4464-B39C-B9F232C32D5A}" type="datetimeFigureOut">
               <a:rPr lang="de-DE" smtClean="0"/>
-              <a:t>23.05.2023</a:t>
+              <a:t>25.05.2023</a:t>
             </a:fld>
             <a:endParaRPr lang="de-DE"/>
           </a:p>
@@ -38592,6 +38604,196 @@
     <p:extLst>
       <p:ext uri="{BB962C8B-B14F-4D97-AF65-F5344CB8AC3E}">
         <p14:creationId xmlns:p14="http://schemas.microsoft.com/office/powerpoint/2010/main" val="3980518628"/>
+      </p:ext>
+    </p:extLst>
+  </p:cSld>
+  <p:clrMapOvr>
+    <a:masterClrMapping/>
+  </p:clrMapOvr>
+</p:sld>
+</file>
+
+<file path=ppt/slides/slide10.xml><?xml version="1.0" encoding="utf-8"?>
+<p:sld xmlns:a="http://schemas.openxmlformats.org/drawingml/2006/main" xmlns:r="http://schemas.openxmlformats.org/officeDocument/2006/relationships" xmlns:p="http://schemas.openxmlformats.org/presentationml/2006/main">
+  <p:cSld>
+    <p:spTree>
+      <p:nvGrpSpPr>
+        <p:cNvPr id="1" name=""/>
+        <p:cNvGrpSpPr/>
+        <p:nvPr/>
+      </p:nvGrpSpPr>
+      <p:grpSpPr>
+        <a:xfrm>
+          <a:off x="0" y="0"/>
+          <a:ext cx="0" cy="0"/>
+          <a:chOff x="0" y="0"/>
+          <a:chExt cx="0" cy="0"/>
+        </a:xfrm>
+      </p:grpSpPr>
+      <p:sp>
+        <p:nvSpPr>
+          <p:cNvPr id="2" name="Titel 1">
+            <a:extLst>
+              <a:ext uri="{FF2B5EF4-FFF2-40B4-BE49-F238E27FC236}">
+                <a16:creationId xmlns:a16="http://schemas.microsoft.com/office/drawing/2014/main" id="{0B6C9755-5CEB-444E-8AE8-3FCA3E65367F}"/>
+              </a:ext>
+            </a:extLst>
+          </p:cNvPr>
+          <p:cNvSpPr>
+            <a:spLocks noGrp="1"/>
+          </p:cNvSpPr>
+          <p:nvPr>
+            <p:ph type="title"/>
+          </p:nvPr>
+        </p:nvSpPr>
+        <p:spPr>
+          <a:xfrm>
+            <a:off x="838200" y="365125"/>
+            <a:ext cx="10515600" cy="1325563"/>
+          </a:xfrm>
+        </p:spPr>
+        <p:txBody>
+          <a:bodyPr/>
+          <a:lstStyle/>
+          <a:p>
+            <a:r>
+              <a:rPr lang="de-DE" dirty="0"/>
+              <a:t>Problem Statement</a:t>
+            </a:r>
+          </a:p>
+        </p:txBody>
+      </p:sp>
+      <p:sp>
+        <p:nvSpPr>
+          <p:cNvPr id="3" name="Inhaltsplatzhalter 2">
+            <a:extLst>
+              <a:ext uri="{FF2B5EF4-FFF2-40B4-BE49-F238E27FC236}">
+                <a16:creationId xmlns:a16="http://schemas.microsoft.com/office/drawing/2014/main" id="{137375D5-F574-4589-B859-C4338E397C0A}"/>
+              </a:ext>
+            </a:extLst>
+          </p:cNvPr>
+          <p:cNvSpPr>
+            <a:spLocks noGrp="1"/>
+          </p:cNvSpPr>
+          <p:nvPr>
+            <p:ph idx="1"/>
+          </p:nvPr>
+        </p:nvSpPr>
+        <p:spPr/>
+        <p:txBody>
+          <a:bodyPr/>
+          <a:lstStyle/>
+          <a:p>
+            <a:r>
+              <a:rPr lang="de-DE" dirty="0" err="1"/>
+              <a:t>Luenberger</a:t>
+            </a:r>
+            <a:r>
+              <a:rPr lang="de-DE" dirty="0"/>
+              <a:t> Beobachter</a:t>
+            </a:r>
+          </a:p>
+          <a:p>
+            <a:r>
+              <a:rPr lang="de-DE" dirty="0"/>
+              <a:t>Grey: </a:t>
+            </a:r>
+            <a:r>
+              <a:rPr lang="de-DE" dirty="0" err="1"/>
+              <a:t>state</a:t>
+            </a:r>
+            <a:r>
+              <a:rPr lang="de-DE" dirty="0"/>
+              <a:t>, </a:t>
+            </a:r>
+            <a:r>
+              <a:rPr lang="de-DE" dirty="0" err="1"/>
+              <a:t>red</a:t>
+            </a:r>
+            <a:r>
+              <a:rPr lang="de-DE" dirty="0"/>
+              <a:t>: </a:t>
+            </a:r>
+            <a:r>
+              <a:rPr lang="de-DE" dirty="0" err="1"/>
+              <a:t>sensor</a:t>
+            </a:r>
+            <a:r>
+              <a:rPr lang="de-DE" dirty="0"/>
+              <a:t> </a:t>
+            </a:r>
+            <a:r>
+              <a:rPr lang="de-DE" dirty="0" err="1"/>
+              <a:t>value</a:t>
+            </a:r>
+            <a:endParaRPr lang="de-DE" dirty="0"/>
+          </a:p>
+        </p:txBody>
+      </p:sp>
+      <p:pic>
+        <p:nvPicPr>
+          <p:cNvPr id="15" name="Grafik 14">
+            <a:extLst>
+              <a:ext uri="{FF2B5EF4-FFF2-40B4-BE49-F238E27FC236}">
+                <a16:creationId xmlns:a16="http://schemas.microsoft.com/office/drawing/2014/main" id="{71CE78D1-B116-44BE-8B7E-B9D00F3B4F22}"/>
+              </a:ext>
+            </a:extLst>
+          </p:cNvPr>
+          <p:cNvPicPr>
+            <a:picLocks noChangeAspect="1"/>
+          </p:cNvPicPr>
+          <p:nvPr/>
+        </p:nvPicPr>
+        <p:blipFill>
+          <a:blip r:embed="rId2"/>
+          <a:stretch>
+            <a:fillRect/>
+          </a:stretch>
+        </p:blipFill>
+        <p:spPr>
+          <a:xfrm>
+            <a:off x="7296955" y="1561216"/>
+            <a:ext cx="3317865" cy="1479727"/>
+          </a:xfrm>
+          <a:prstGeom prst="rect">
+            <a:avLst/>
+          </a:prstGeom>
+        </p:spPr>
+      </p:pic>
+      <p:pic>
+        <p:nvPicPr>
+          <p:cNvPr id="4" name="Grafik 3">
+            <a:extLst>
+              <a:ext uri="{FF2B5EF4-FFF2-40B4-BE49-F238E27FC236}">
+                <a16:creationId xmlns:a16="http://schemas.microsoft.com/office/drawing/2014/main" id="{5AAD4701-7572-4896-A3F8-B7DBC1196B21}"/>
+              </a:ext>
+            </a:extLst>
+          </p:cNvPr>
+          <p:cNvPicPr>
+            <a:picLocks noChangeAspect="1"/>
+          </p:cNvPicPr>
+          <p:nvPr/>
+        </p:nvPicPr>
+        <p:blipFill>
+          <a:blip r:embed="rId3"/>
+          <a:stretch>
+            <a:fillRect/>
+          </a:stretch>
+        </p:blipFill>
+        <p:spPr>
+          <a:xfrm>
+            <a:off x="7100914" y="3252083"/>
+            <a:ext cx="3709946" cy="2460442"/>
+          </a:xfrm>
+          <a:prstGeom prst="rect">
+            <a:avLst/>
+          </a:prstGeom>
+        </p:spPr>
+      </p:pic>
+    </p:spTree>
+    <p:extLst>
+      <p:ext uri="{BB962C8B-B14F-4D97-AF65-F5344CB8AC3E}">
+        <p14:creationId xmlns:p14="http://schemas.microsoft.com/office/powerpoint/2010/main" val="3603659497"/>
       </p:ext>
     </p:extLst>
   </p:cSld>
@@ -39181,6 +39383,2324 @@
       </p:grpSpPr>
       <p:sp>
         <p:nvSpPr>
+          <p:cNvPr id="27" name="Freihandform: Form 26">
+            <a:extLst>
+              <a:ext uri="{FF2B5EF4-FFF2-40B4-BE49-F238E27FC236}">
+                <a16:creationId xmlns:a16="http://schemas.microsoft.com/office/drawing/2014/main" id="{D54EF857-5F49-4A80-88B3-AC82488E2222}"/>
+              </a:ext>
+            </a:extLst>
+          </p:cNvPr>
+          <p:cNvSpPr/>
+          <p:nvPr/>
+        </p:nvSpPr>
+        <p:spPr>
+          <a:xfrm rot="5400000">
+            <a:off x="1251800" y="337599"/>
+            <a:ext cx="1440000" cy="1889650"/>
+          </a:xfrm>
+          <a:custGeom>
+            <a:avLst/>
+            <a:gdLst>
+              <a:gd name="connsiteX0" fmla="*/ 720000 w 1440000"/>
+              <a:gd name="connsiteY0" fmla="*/ 0 h 1889650"/>
+              <a:gd name="connsiteX1" fmla="*/ 1080000 w 1440000"/>
+              <a:gd name="connsiteY1" fmla="*/ 360000 h 1889650"/>
+              <a:gd name="connsiteX2" fmla="*/ 1072686 w 1440000"/>
+              <a:gd name="connsiteY2" fmla="*/ 432553 h 1889650"/>
+              <a:gd name="connsiteX3" fmla="*/ 1067379 w 1440000"/>
+              <a:gd name="connsiteY3" fmla="*/ 449650 h 1889650"/>
+              <a:gd name="connsiteX4" fmla="*/ 1440000 w 1440000"/>
+              <a:gd name="connsiteY4" fmla="*/ 449650 h 1889650"/>
+              <a:gd name="connsiteX5" fmla="*/ 1440000 w 1440000"/>
+              <a:gd name="connsiteY5" fmla="*/ 822271 h 1889650"/>
+              <a:gd name="connsiteX6" fmla="*/ 1422903 w 1440000"/>
+              <a:gd name="connsiteY6" fmla="*/ 816964 h 1889650"/>
+              <a:gd name="connsiteX7" fmla="*/ 1350350 w 1440000"/>
+              <a:gd name="connsiteY7" fmla="*/ 809650 h 1889650"/>
+              <a:gd name="connsiteX8" fmla="*/ 990350 w 1440000"/>
+              <a:gd name="connsiteY8" fmla="*/ 1169650 h 1889650"/>
+              <a:gd name="connsiteX9" fmla="*/ 1350350 w 1440000"/>
+              <a:gd name="connsiteY9" fmla="*/ 1529650 h 1889650"/>
+              <a:gd name="connsiteX10" fmla="*/ 1422903 w 1440000"/>
+              <a:gd name="connsiteY10" fmla="*/ 1522336 h 1889650"/>
+              <a:gd name="connsiteX11" fmla="*/ 1440000 w 1440000"/>
+              <a:gd name="connsiteY11" fmla="*/ 1517029 h 1889650"/>
+              <a:gd name="connsiteX12" fmla="*/ 1440000 w 1440000"/>
+              <a:gd name="connsiteY12" fmla="*/ 1889650 h 1889650"/>
+              <a:gd name="connsiteX13" fmla="*/ 0 w 1440000"/>
+              <a:gd name="connsiteY13" fmla="*/ 1889650 h 1889650"/>
+              <a:gd name="connsiteX14" fmla="*/ 0 w 1440000"/>
+              <a:gd name="connsiteY14" fmla="*/ 449650 h 1889650"/>
+              <a:gd name="connsiteX15" fmla="*/ 372621 w 1440000"/>
+              <a:gd name="connsiteY15" fmla="*/ 449650 h 1889650"/>
+              <a:gd name="connsiteX16" fmla="*/ 367314 w 1440000"/>
+              <a:gd name="connsiteY16" fmla="*/ 432553 h 1889650"/>
+              <a:gd name="connsiteX17" fmla="*/ 360000 w 1440000"/>
+              <a:gd name="connsiteY17" fmla="*/ 360000 h 1889650"/>
+              <a:gd name="connsiteX18" fmla="*/ 720000 w 1440000"/>
+              <a:gd name="connsiteY18" fmla="*/ 0 h 1889650"/>
+            </a:gdLst>
+            <a:ahLst/>
+            <a:cxnLst>
+              <a:cxn ang="0">
+                <a:pos x="connsiteX0" y="connsiteY0"/>
+              </a:cxn>
+              <a:cxn ang="0">
+                <a:pos x="connsiteX1" y="connsiteY1"/>
+              </a:cxn>
+              <a:cxn ang="0">
+                <a:pos x="connsiteX2" y="connsiteY2"/>
+              </a:cxn>
+              <a:cxn ang="0">
+                <a:pos x="connsiteX3" y="connsiteY3"/>
+              </a:cxn>
+              <a:cxn ang="0">
+                <a:pos x="connsiteX4" y="connsiteY4"/>
+              </a:cxn>
+              <a:cxn ang="0">
+                <a:pos x="connsiteX5" y="connsiteY5"/>
+              </a:cxn>
+              <a:cxn ang="0">
+                <a:pos x="connsiteX6" y="connsiteY6"/>
+              </a:cxn>
+              <a:cxn ang="0">
+                <a:pos x="connsiteX7" y="connsiteY7"/>
+              </a:cxn>
+              <a:cxn ang="0">
+                <a:pos x="connsiteX8" y="connsiteY8"/>
+              </a:cxn>
+              <a:cxn ang="0">
+                <a:pos x="connsiteX9" y="connsiteY9"/>
+              </a:cxn>
+              <a:cxn ang="0">
+                <a:pos x="connsiteX10" y="connsiteY10"/>
+              </a:cxn>
+              <a:cxn ang="0">
+                <a:pos x="connsiteX11" y="connsiteY11"/>
+              </a:cxn>
+              <a:cxn ang="0">
+                <a:pos x="connsiteX12" y="connsiteY12"/>
+              </a:cxn>
+              <a:cxn ang="0">
+                <a:pos x="connsiteX13" y="connsiteY13"/>
+              </a:cxn>
+              <a:cxn ang="0">
+                <a:pos x="connsiteX14" y="connsiteY14"/>
+              </a:cxn>
+              <a:cxn ang="0">
+                <a:pos x="connsiteX15" y="connsiteY15"/>
+              </a:cxn>
+              <a:cxn ang="0">
+                <a:pos x="connsiteX16" y="connsiteY16"/>
+              </a:cxn>
+              <a:cxn ang="0">
+                <a:pos x="connsiteX17" y="connsiteY17"/>
+              </a:cxn>
+              <a:cxn ang="0">
+                <a:pos x="connsiteX18" y="connsiteY18"/>
+              </a:cxn>
+            </a:cxnLst>
+            <a:rect l="l" t="t" r="r" b="b"/>
+            <a:pathLst>
+              <a:path w="1440000" h="1889650">
+                <a:moveTo>
+                  <a:pt x="720000" y="0"/>
+                </a:moveTo>
+                <a:cubicBezTo>
+                  <a:pt x="918823" y="0"/>
+                  <a:pt x="1080000" y="161177"/>
+                  <a:pt x="1080000" y="360000"/>
+                </a:cubicBezTo>
+                <a:cubicBezTo>
+                  <a:pt x="1080000" y="384853"/>
+                  <a:pt x="1077482" y="409118"/>
+                  <a:pt x="1072686" y="432553"/>
+                </a:cubicBezTo>
+                <a:lnTo>
+                  <a:pt x="1067379" y="449650"/>
+                </a:lnTo>
+                <a:lnTo>
+                  <a:pt x="1440000" y="449650"/>
+                </a:lnTo>
+                <a:lnTo>
+                  <a:pt x="1440000" y="822271"/>
+                </a:lnTo>
+                <a:lnTo>
+                  <a:pt x="1422903" y="816964"/>
+                </a:lnTo>
+                <a:cubicBezTo>
+                  <a:pt x="1399468" y="812169"/>
+                  <a:pt x="1375203" y="809650"/>
+                  <a:pt x="1350350" y="809650"/>
+                </a:cubicBezTo>
+                <a:cubicBezTo>
+                  <a:pt x="1151527" y="809650"/>
+                  <a:pt x="990350" y="970827"/>
+                  <a:pt x="990350" y="1169650"/>
+                </a:cubicBezTo>
+                <a:cubicBezTo>
+                  <a:pt x="990350" y="1368473"/>
+                  <a:pt x="1151527" y="1529650"/>
+                  <a:pt x="1350350" y="1529650"/>
+                </a:cubicBezTo>
+                <a:cubicBezTo>
+                  <a:pt x="1375203" y="1529650"/>
+                  <a:pt x="1399468" y="1527132"/>
+                  <a:pt x="1422903" y="1522336"/>
+                </a:cubicBezTo>
+                <a:lnTo>
+                  <a:pt x="1440000" y="1517029"/>
+                </a:lnTo>
+                <a:lnTo>
+                  <a:pt x="1440000" y="1889650"/>
+                </a:lnTo>
+                <a:lnTo>
+                  <a:pt x="0" y="1889650"/>
+                </a:lnTo>
+                <a:lnTo>
+                  <a:pt x="0" y="449650"/>
+                </a:lnTo>
+                <a:lnTo>
+                  <a:pt x="372621" y="449650"/>
+                </a:lnTo>
+                <a:lnTo>
+                  <a:pt x="367314" y="432553"/>
+                </a:lnTo>
+                <a:cubicBezTo>
+                  <a:pt x="362519" y="409118"/>
+                  <a:pt x="360000" y="384853"/>
+                  <a:pt x="360000" y="360000"/>
+                </a:cubicBezTo>
+                <a:cubicBezTo>
+                  <a:pt x="360000" y="161177"/>
+                  <a:pt x="521177" y="0"/>
+                  <a:pt x="720000" y="0"/>
+                </a:cubicBezTo>
+                <a:close/>
+              </a:path>
+            </a:pathLst>
+          </a:custGeom>
+          <a:noFill/>
+          <a:ln/>
+        </p:spPr>
+        <p:style>
+          <a:lnRef idx="2">
+            <a:schemeClr val="accent2"/>
+          </a:lnRef>
+          <a:fillRef idx="1">
+            <a:schemeClr val="lt1"/>
+          </a:fillRef>
+          <a:effectRef idx="0">
+            <a:schemeClr val="accent2"/>
+          </a:effectRef>
+          <a:fontRef idx="minor">
+            <a:schemeClr val="dk1"/>
+          </a:fontRef>
+        </p:style>
+        <p:txBody>
+          <a:bodyPr vert="vert270" rtlCol="0" anchor="ctr"/>
+          <a:lstStyle/>
+          <a:p>
+            <a:pPr algn="ctr"/>
+            <a:endParaRPr lang="de-DE" dirty="0">
+              <a:solidFill>
+                <a:schemeClr val="tx1"/>
+              </a:solidFill>
+            </a:endParaRPr>
+          </a:p>
+        </p:txBody>
+      </p:sp>
+      <p:sp>
+        <p:nvSpPr>
+          <p:cNvPr id="29" name="Freihandform: Form 28">
+            <a:extLst>
+              <a:ext uri="{FF2B5EF4-FFF2-40B4-BE49-F238E27FC236}">
+                <a16:creationId xmlns:a16="http://schemas.microsoft.com/office/drawing/2014/main" id="{949C1B70-5791-48AF-AB19-0A8E8E820A6B}"/>
+              </a:ext>
+            </a:extLst>
+          </p:cNvPr>
+          <p:cNvSpPr/>
+          <p:nvPr/>
+        </p:nvSpPr>
+        <p:spPr>
+          <a:xfrm rot="10800000">
+            <a:off x="2471062" y="562424"/>
+            <a:ext cx="1440000" cy="1889650"/>
+          </a:xfrm>
+          <a:custGeom>
+            <a:avLst/>
+            <a:gdLst>
+              <a:gd name="connsiteX0" fmla="*/ 720000 w 1440000"/>
+              <a:gd name="connsiteY0" fmla="*/ 0 h 1889650"/>
+              <a:gd name="connsiteX1" fmla="*/ 1080000 w 1440000"/>
+              <a:gd name="connsiteY1" fmla="*/ 360000 h 1889650"/>
+              <a:gd name="connsiteX2" fmla="*/ 1072686 w 1440000"/>
+              <a:gd name="connsiteY2" fmla="*/ 432553 h 1889650"/>
+              <a:gd name="connsiteX3" fmla="*/ 1067379 w 1440000"/>
+              <a:gd name="connsiteY3" fmla="*/ 449650 h 1889650"/>
+              <a:gd name="connsiteX4" fmla="*/ 1440000 w 1440000"/>
+              <a:gd name="connsiteY4" fmla="*/ 449650 h 1889650"/>
+              <a:gd name="connsiteX5" fmla="*/ 1440000 w 1440000"/>
+              <a:gd name="connsiteY5" fmla="*/ 822271 h 1889650"/>
+              <a:gd name="connsiteX6" fmla="*/ 1422903 w 1440000"/>
+              <a:gd name="connsiteY6" fmla="*/ 816964 h 1889650"/>
+              <a:gd name="connsiteX7" fmla="*/ 1350350 w 1440000"/>
+              <a:gd name="connsiteY7" fmla="*/ 809650 h 1889650"/>
+              <a:gd name="connsiteX8" fmla="*/ 990350 w 1440000"/>
+              <a:gd name="connsiteY8" fmla="*/ 1169650 h 1889650"/>
+              <a:gd name="connsiteX9" fmla="*/ 1350350 w 1440000"/>
+              <a:gd name="connsiteY9" fmla="*/ 1529650 h 1889650"/>
+              <a:gd name="connsiteX10" fmla="*/ 1422903 w 1440000"/>
+              <a:gd name="connsiteY10" fmla="*/ 1522336 h 1889650"/>
+              <a:gd name="connsiteX11" fmla="*/ 1440000 w 1440000"/>
+              <a:gd name="connsiteY11" fmla="*/ 1517029 h 1889650"/>
+              <a:gd name="connsiteX12" fmla="*/ 1440000 w 1440000"/>
+              <a:gd name="connsiteY12" fmla="*/ 1889650 h 1889650"/>
+              <a:gd name="connsiteX13" fmla="*/ 0 w 1440000"/>
+              <a:gd name="connsiteY13" fmla="*/ 1889650 h 1889650"/>
+              <a:gd name="connsiteX14" fmla="*/ 0 w 1440000"/>
+              <a:gd name="connsiteY14" fmla="*/ 449650 h 1889650"/>
+              <a:gd name="connsiteX15" fmla="*/ 372621 w 1440000"/>
+              <a:gd name="connsiteY15" fmla="*/ 449650 h 1889650"/>
+              <a:gd name="connsiteX16" fmla="*/ 367314 w 1440000"/>
+              <a:gd name="connsiteY16" fmla="*/ 432553 h 1889650"/>
+              <a:gd name="connsiteX17" fmla="*/ 360000 w 1440000"/>
+              <a:gd name="connsiteY17" fmla="*/ 360000 h 1889650"/>
+              <a:gd name="connsiteX18" fmla="*/ 720000 w 1440000"/>
+              <a:gd name="connsiteY18" fmla="*/ 0 h 1889650"/>
+            </a:gdLst>
+            <a:ahLst/>
+            <a:cxnLst>
+              <a:cxn ang="0">
+                <a:pos x="connsiteX0" y="connsiteY0"/>
+              </a:cxn>
+              <a:cxn ang="0">
+                <a:pos x="connsiteX1" y="connsiteY1"/>
+              </a:cxn>
+              <a:cxn ang="0">
+                <a:pos x="connsiteX2" y="connsiteY2"/>
+              </a:cxn>
+              <a:cxn ang="0">
+                <a:pos x="connsiteX3" y="connsiteY3"/>
+              </a:cxn>
+              <a:cxn ang="0">
+                <a:pos x="connsiteX4" y="connsiteY4"/>
+              </a:cxn>
+              <a:cxn ang="0">
+                <a:pos x="connsiteX5" y="connsiteY5"/>
+              </a:cxn>
+              <a:cxn ang="0">
+                <a:pos x="connsiteX6" y="connsiteY6"/>
+              </a:cxn>
+              <a:cxn ang="0">
+                <a:pos x="connsiteX7" y="connsiteY7"/>
+              </a:cxn>
+              <a:cxn ang="0">
+                <a:pos x="connsiteX8" y="connsiteY8"/>
+              </a:cxn>
+              <a:cxn ang="0">
+                <a:pos x="connsiteX9" y="connsiteY9"/>
+              </a:cxn>
+              <a:cxn ang="0">
+                <a:pos x="connsiteX10" y="connsiteY10"/>
+              </a:cxn>
+              <a:cxn ang="0">
+                <a:pos x="connsiteX11" y="connsiteY11"/>
+              </a:cxn>
+              <a:cxn ang="0">
+                <a:pos x="connsiteX12" y="connsiteY12"/>
+              </a:cxn>
+              <a:cxn ang="0">
+                <a:pos x="connsiteX13" y="connsiteY13"/>
+              </a:cxn>
+              <a:cxn ang="0">
+                <a:pos x="connsiteX14" y="connsiteY14"/>
+              </a:cxn>
+              <a:cxn ang="0">
+                <a:pos x="connsiteX15" y="connsiteY15"/>
+              </a:cxn>
+              <a:cxn ang="0">
+                <a:pos x="connsiteX16" y="connsiteY16"/>
+              </a:cxn>
+              <a:cxn ang="0">
+                <a:pos x="connsiteX17" y="connsiteY17"/>
+              </a:cxn>
+              <a:cxn ang="0">
+                <a:pos x="connsiteX18" y="connsiteY18"/>
+              </a:cxn>
+            </a:cxnLst>
+            <a:rect l="l" t="t" r="r" b="b"/>
+            <a:pathLst>
+              <a:path w="1440000" h="1889650">
+                <a:moveTo>
+                  <a:pt x="720000" y="0"/>
+                </a:moveTo>
+                <a:cubicBezTo>
+                  <a:pt x="918823" y="0"/>
+                  <a:pt x="1080000" y="161177"/>
+                  <a:pt x="1080000" y="360000"/>
+                </a:cubicBezTo>
+                <a:cubicBezTo>
+                  <a:pt x="1080000" y="384853"/>
+                  <a:pt x="1077482" y="409118"/>
+                  <a:pt x="1072686" y="432553"/>
+                </a:cubicBezTo>
+                <a:lnTo>
+                  <a:pt x="1067379" y="449650"/>
+                </a:lnTo>
+                <a:lnTo>
+                  <a:pt x="1440000" y="449650"/>
+                </a:lnTo>
+                <a:lnTo>
+                  <a:pt x="1440000" y="822271"/>
+                </a:lnTo>
+                <a:lnTo>
+                  <a:pt x="1422903" y="816964"/>
+                </a:lnTo>
+                <a:cubicBezTo>
+                  <a:pt x="1399468" y="812169"/>
+                  <a:pt x="1375203" y="809650"/>
+                  <a:pt x="1350350" y="809650"/>
+                </a:cubicBezTo>
+                <a:cubicBezTo>
+                  <a:pt x="1151527" y="809650"/>
+                  <a:pt x="990350" y="970827"/>
+                  <a:pt x="990350" y="1169650"/>
+                </a:cubicBezTo>
+                <a:cubicBezTo>
+                  <a:pt x="990350" y="1368473"/>
+                  <a:pt x="1151527" y="1529650"/>
+                  <a:pt x="1350350" y="1529650"/>
+                </a:cubicBezTo>
+                <a:cubicBezTo>
+                  <a:pt x="1375203" y="1529650"/>
+                  <a:pt x="1399468" y="1527132"/>
+                  <a:pt x="1422903" y="1522336"/>
+                </a:cubicBezTo>
+                <a:lnTo>
+                  <a:pt x="1440000" y="1517029"/>
+                </a:lnTo>
+                <a:lnTo>
+                  <a:pt x="1440000" y="1889650"/>
+                </a:lnTo>
+                <a:lnTo>
+                  <a:pt x="0" y="1889650"/>
+                </a:lnTo>
+                <a:lnTo>
+                  <a:pt x="0" y="449650"/>
+                </a:lnTo>
+                <a:lnTo>
+                  <a:pt x="372621" y="449650"/>
+                </a:lnTo>
+                <a:lnTo>
+                  <a:pt x="367314" y="432553"/>
+                </a:lnTo>
+                <a:cubicBezTo>
+                  <a:pt x="362519" y="409118"/>
+                  <a:pt x="360000" y="384853"/>
+                  <a:pt x="360000" y="360000"/>
+                </a:cubicBezTo>
+                <a:cubicBezTo>
+                  <a:pt x="360000" y="161177"/>
+                  <a:pt x="521177" y="0"/>
+                  <a:pt x="720000" y="0"/>
+                </a:cubicBezTo>
+                <a:close/>
+              </a:path>
+            </a:pathLst>
+          </a:custGeom>
+          <a:noFill/>
+          <a:ln/>
+        </p:spPr>
+        <p:style>
+          <a:lnRef idx="2">
+            <a:schemeClr val="accent5"/>
+          </a:lnRef>
+          <a:fillRef idx="1">
+            <a:schemeClr val="lt1"/>
+          </a:fillRef>
+          <a:effectRef idx="0">
+            <a:schemeClr val="accent5"/>
+          </a:effectRef>
+          <a:fontRef idx="minor">
+            <a:schemeClr val="dk1"/>
+          </a:fontRef>
+        </p:style>
+        <p:txBody>
+          <a:bodyPr vert="horz" rtlCol="0" anchor="ctr"/>
+          <a:lstStyle/>
+          <a:p>
+            <a:pPr algn="ctr"/>
+            <a:endParaRPr lang="de-DE" dirty="0">
+              <a:solidFill>
+                <a:schemeClr val="tx1"/>
+              </a:solidFill>
+            </a:endParaRPr>
+          </a:p>
+        </p:txBody>
+      </p:sp>
+      <p:sp>
+        <p:nvSpPr>
+          <p:cNvPr id="30" name="Freihandform: Form 29">
+            <a:extLst>
+              <a:ext uri="{FF2B5EF4-FFF2-40B4-BE49-F238E27FC236}">
+                <a16:creationId xmlns:a16="http://schemas.microsoft.com/office/drawing/2014/main" id="{E34ABAE1-96DD-4CF9-B6AB-30DD5009EAA9}"/>
+              </a:ext>
+            </a:extLst>
+          </p:cNvPr>
+          <p:cNvSpPr/>
+          <p:nvPr/>
+        </p:nvSpPr>
+        <p:spPr>
+          <a:xfrm>
+            <a:off x="1026975" y="1556674"/>
+            <a:ext cx="1440000" cy="1889650"/>
+          </a:xfrm>
+          <a:custGeom>
+            <a:avLst/>
+            <a:gdLst>
+              <a:gd name="connsiteX0" fmla="*/ 720000 w 1440000"/>
+              <a:gd name="connsiteY0" fmla="*/ 0 h 1889650"/>
+              <a:gd name="connsiteX1" fmla="*/ 1080000 w 1440000"/>
+              <a:gd name="connsiteY1" fmla="*/ 360000 h 1889650"/>
+              <a:gd name="connsiteX2" fmla="*/ 1072686 w 1440000"/>
+              <a:gd name="connsiteY2" fmla="*/ 432553 h 1889650"/>
+              <a:gd name="connsiteX3" fmla="*/ 1067379 w 1440000"/>
+              <a:gd name="connsiteY3" fmla="*/ 449650 h 1889650"/>
+              <a:gd name="connsiteX4" fmla="*/ 1440000 w 1440000"/>
+              <a:gd name="connsiteY4" fmla="*/ 449650 h 1889650"/>
+              <a:gd name="connsiteX5" fmla="*/ 1440000 w 1440000"/>
+              <a:gd name="connsiteY5" fmla="*/ 822271 h 1889650"/>
+              <a:gd name="connsiteX6" fmla="*/ 1422903 w 1440000"/>
+              <a:gd name="connsiteY6" fmla="*/ 816964 h 1889650"/>
+              <a:gd name="connsiteX7" fmla="*/ 1350350 w 1440000"/>
+              <a:gd name="connsiteY7" fmla="*/ 809650 h 1889650"/>
+              <a:gd name="connsiteX8" fmla="*/ 990350 w 1440000"/>
+              <a:gd name="connsiteY8" fmla="*/ 1169650 h 1889650"/>
+              <a:gd name="connsiteX9" fmla="*/ 1350350 w 1440000"/>
+              <a:gd name="connsiteY9" fmla="*/ 1529650 h 1889650"/>
+              <a:gd name="connsiteX10" fmla="*/ 1422903 w 1440000"/>
+              <a:gd name="connsiteY10" fmla="*/ 1522336 h 1889650"/>
+              <a:gd name="connsiteX11" fmla="*/ 1440000 w 1440000"/>
+              <a:gd name="connsiteY11" fmla="*/ 1517029 h 1889650"/>
+              <a:gd name="connsiteX12" fmla="*/ 1440000 w 1440000"/>
+              <a:gd name="connsiteY12" fmla="*/ 1889650 h 1889650"/>
+              <a:gd name="connsiteX13" fmla="*/ 0 w 1440000"/>
+              <a:gd name="connsiteY13" fmla="*/ 1889650 h 1889650"/>
+              <a:gd name="connsiteX14" fmla="*/ 0 w 1440000"/>
+              <a:gd name="connsiteY14" fmla="*/ 449650 h 1889650"/>
+              <a:gd name="connsiteX15" fmla="*/ 372621 w 1440000"/>
+              <a:gd name="connsiteY15" fmla="*/ 449650 h 1889650"/>
+              <a:gd name="connsiteX16" fmla="*/ 367314 w 1440000"/>
+              <a:gd name="connsiteY16" fmla="*/ 432553 h 1889650"/>
+              <a:gd name="connsiteX17" fmla="*/ 360000 w 1440000"/>
+              <a:gd name="connsiteY17" fmla="*/ 360000 h 1889650"/>
+              <a:gd name="connsiteX18" fmla="*/ 720000 w 1440000"/>
+              <a:gd name="connsiteY18" fmla="*/ 0 h 1889650"/>
+            </a:gdLst>
+            <a:ahLst/>
+            <a:cxnLst>
+              <a:cxn ang="0">
+                <a:pos x="connsiteX0" y="connsiteY0"/>
+              </a:cxn>
+              <a:cxn ang="0">
+                <a:pos x="connsiteX1" y="connsiteY1"/>
+              </a:cxn>
+              <a:cxn ang="0">
+                <a:pos x="connsiteX2" y="connsiteY2"/>
+              </a:cxn>
+              <a:cxn ang="0">
+                <a:pos x="connsiteX3" y="connsiteY3"/>
+              </a:cxn>
+              <a:cxn ang="0">
+                <a:pos x="connsiteX4" y="connsiteY4"/>
+              </a:cxn>
+              <a:cxn ang="0">
+                <a:pos x="connsiteX5" y="connsiteY5"/>
+              </a:cxn>
+              <a:cxn ang="0">
+                <a:pos x="connsiteX6" y="connsiteY6"/>
+              </a:cxn>
+              <a:cxn ang="0">
+                <a:pos x="connsiteX7" y="connsiteY7"/>
+              </a:cxn>
+              <a:cxn ang="0">
+                <a:pos x="connsiteX8" y="connsiteY8"/>
+              </a:cxn>
+              <a:cxn ang="0">
+                <a:pos x="connsiteX9" y="connsiteY9"/>
+              </a:cxn>
+              <a:cxn ang="0">
+                <a:pos x="connsiteX10" y="connsiteY10"/>
+              </a:cxn>
+              <a:cxn ang="0">
+                <a:pos x="connsiteX11" y="connsiteY11"/>
+              </a:cxn>
+              <a:cxn ang="0">
+                <a:pos x="connsiteX12" y="connsiteY12"/>
+              </a:cxn>
+              <a:cxn ang="0">
+                <a:pos x="connsiteX13" y="connsiteY13"/>
+              </a:cxn>
+              <a:cxn ang="0">
+                <a:pos x="connsiteX14" y="connsiteY14"/>
+              </a:cxn>
+              <a:cxn ang="0">
+                <a:pos x="connsiteX15" y="connsiteY15"/>
+              </a:cxn>
+              <a:cxn ang="0">
+                <a:pos x="connsiteX16" y="connsiteY16"/>
+              </a:cxn>
+              <a:cxn ang="0">
+                <a:pos x="connsiteX17" y="connsiteY17"/>
+              </a:cxn>
+              <a:cxn ang="0">
+                <a:pos x="connsiteX18" y="connsiteY18"/>
+              </a:cxn>
+            </a:cxnLst>
+            <a:rect l="l" t="t" r="r" b="b"/>
+            <a:pathLst>
+              <a:path w="1440000" h="1889650">
+                <a:moveTo>
+                  <a:pt x="720000" y="0"/>
+                </a:moveTo>
+                <a:cubicBezTo>
+                  <a:pt x="918823" y="0"/>
+                  <a:pt x="1080000" y="161177"/>
+                  <a:pt x="1080000" y="360000"/>
+                </a:cubicBezTo>
+                <a:cubicBezTo>
+                  <a:pt x="1080000" y="384853"/>
+                  <a:pt x="1077482" y="409118"/>
+                  <a:pt x="1072686" y="432553"/>
+                </a:cubicBezTo>
+                <a:lnTo>
+                  <a:pt x="1067379" y="449650"/>
+                </a:lnTo>
+                <a:lnTo>
+                  <a:pt x="1440000" y="449650"/>
+                </a:lnTo>
+                <a:lnTo>
+                  <a:pt x="1440000" y="822271"/>
+                </a:lnTo>
+                <a:lnTo>
+                  <a:pt x="1422903" y="816964"/>
+                </a:lnTo>
+                <a:cubicBezTo>
+                  <a:pt x="1399468" y="812169"/>
+                  <a:pt x="1375203" y="809650"/>
+                  <a:pt x="1350350" y="809650"/>
+                </a:cubicBezTo>
+                <a:cubicBezTo>
+                  <a:pt x="1151527" y="809650"/>
+                  <a:pt x="990350" y="970827"/>
+                  <a:pt x="990350" y="1169650"/>
+                </a:cubicBezTo>
+                <a:cubicBezTo>
+                  <a:pt x="990350" y="1368473"/>
+                  <a:pt x="1151527" y="1529650"/>
+                  <a:pt x="1350350" y="1529650"/>
+                </a:cubicBezTo>
+                <a:cubicBezTo>
+                  <a:pt x="1375203" y="1529650"/>
+                  <a:pt x="1399468" y="1527132"/>
+                  <a:pt x="1422903" y="1522336"/>
+                </a:cubicBezTo>
+                <a:lnTo>
+                  <a:pt x="1440000" y="1517029"/>
+                </a:lnTo>
+                <a:lnTo>
+                  <a:pt x="1440000" y="1889650"/>
+                </a:lnTo>
+                <a:lnTo>
+                  <a:pt x="0" y="1889650"/>
+                </a:lnTo>
+                <a:lnTo>
+                  <a:pt x="0" y="449650"/>
+                </a:lnTo>
+                <a:lnTo>
+                  <a:pt x="372621" y="449650"/>
+                </a:lnTo>
+                <a:lnTo>
+                  <a:pt x="367314" y="432553"/>
+                </a:lnTo>
+                <a:cubicBezTo>
+                  <a:pt x="362519" y="409118"/>
+                  <a:pt x="360000" y="384853"/>
+                  <a:pt x="360000" y="360000"/>
+                </a:cubicBezTo>
+                <a:cubicBezTo>
+                  <a:pt x="360000" y="161177"/>
+                  <a:pt x="521177" y="0"/>
+                  <a:pt x="720000" y="0"/>
+                </a:cubicBezTo>
+                <a:close/>
+              </a:path>
+            </a:pathLst>
+          </a:custGeom>
+          <a:noFill/>
+          <a:ln/>
+        </p:spPr>
+        <p:style>
+          <a:lnRef idx="2">
+            <a:schemeClr val="accent6"/>
+          </a:lnRef>
+          <a:fillRef idx="1">
+            <a:schemeClr val="lt1"/>
+          </a:fillRef>
+          <a:effectRef idx="0">
+            <a:schemeClr val="accent6"/>
+          </a:effectRef>
+          <a:fontRef idx="minor">
+            <a:schemeClr val="dk1"/>
+          </a:fontRef>
+        </p:style>
+        <p:txBody>
+          <a:bodyPr rtlCol="0" anchor="ctr"/>
+          <a:lstStyle/>
+          <a:p>
+            <a:pPr algn="ctr"/>
+            <a:endParaRPr lang="de-DE" dirty="0">
+              <a:solidFill>
+                <a:schemeClr val="tx1"/>
+              </a:solidFill>
+            </a:endParaRPr>
+          </a:p>
+        </p:txBody>
+      </p:sp>
+      <p:sp>
+        <p:nvSpPr>
+          <p:cNvPr id="31" name="Freihandform: Form 30">
+            <a:extLst>
+              <a:ext uri="{FF2B5EF4-FFF2-40B4-BE49-F238E27FC236}">
+                <a16:creationId xmlns:a16="http://schemas.microsoft.com/office/drawing/2014/main" id="{6A7756EF-A4E6-47C6-835A-35399E381CE3}"/>
+              </a:ext>
+            </a:extLst>
+          </p:cNvPr>
+          <p:cNvSpPr/>
+          <p:nvPr/>
+        </p:nvSpPr>
+        <p:spPr>
+          <a:xfrm rot="16200000">
+            <a:off x="2246237" y="1781499"/>
+            <a:ext cx="1440000" cy="1889650"/>
+          </a:xfrm>
+          <a:custGeom>
+            <a:avLst/>
+            <a:gdLst>
+              <a:gd name="connsiteX0" fmla="*/ 720000 w 1440000"/>
+              <a:gd name="connsiteY0" fmla="*/ 0 h 1889650"/>
+              <a:gd name="connsiteX1" fmla="*/ 1080000 w 1440000"/>
+              <a:gd name="connsiteY1" fmla="*/ 360000 h 1889650"/>
+              <a:gd name="connsiteX2" fmla="*/ 1072686 w 1440000"/>
+              <a:gd name="connsiteY2" fmla="*/ 432553 h 1889650"/>
+              <a:gd name="connsiteX3" fmla="*/ 1067379 w 1440000"/>
+              <a:gd name="connsiteY3" fmla="*/ 449650 h 1889650"/>
+              <a:gd name="connsiteX4" fmla="*/ 1440000 w 1440000"/>
+              <a:gd name="connsiteY4" fmla="*/ 449650 h 1889650"/>
+              <a:gd name="connsiteX5" fmla="*/ 1440000 w 1440000"/>
+              <a:gd name="connsiteY5" fmla="*/ 822271 h 1889650"/>
+              <a:gd name="connsiteX6" fmla="*/ 1422903 w 1440000"/>
+              <a:gd name="connsiteY6" fmla="*/ 816964 h 1889650"/>
+              <a:gd name="connsiteX7" fmla="*/ 1350350 w 1440000"/>
+              <a:gd name="connsiteY7" fmla="*/ 809650 h 1889650"/>
+              <a:gd name="connsiteX8" fmla="*/ 990350 w 1440000"/>
+              <a:gd name="connsiteY8" fmla="*/ 1169650 h 1889650"/>
+              <a:gd name="connsiteX9" fmla="*/ 1350350 w 1440000"/>
+              <a:gd name="connsiteY9" fmla="*/ 1529650 h 1889650"/>
+              <a:gd name="connsiteX10" fmla="*/ 1422903 w 1440000"/>
+              <a:gd name="connsiteY10" fmla="*/ 1522336 h 1889650"/>
+              <a:gd name="connsiteX11" fmla="*/ 1440000 w 1440000"/>
+              <a:gd name="connsiteY11" fmla="*/ 1517029 h 1889650"/>
+              <a:gd name="connsiteX12" fmla="*/ 1440000 w 1440000"/>
+              <a:gd name="connsiteY12" fmla="*/ 1889650 h 1889650"/>
+              <a:gd name="connsiteX13" fmla="*/ 0 w 1440000"/>
+              <a:gd name="connsiteY13" fmla="*/ 1889650 h 1889650"/>
+              <a:gd name="connsiteX14" fmla="*/ 0 w 1440000"/>
+              <a:gd name="connsiteY14" fmla="*/ 449650 h 1889650"/>
+              <a:gd name="connsiteX15" fmla="*/ 372621 w 1440000"/>
+              <a:gd name="connsiteY15" fmla="*/ 449650 h 1889650"/>
+              <a:gd name="connsiteX16" fmla="*/ 367314 w 1440000"/>
+              <a:gd name="connsiteY16" fmla="*/ 432553 h 1889650"/>
+              <a:gd name="connsiteX17" fmla="*/ 360000 w 1440000"/>
+              <a:gd name="connsiteY17" fmla="*/ 360000 h 1889650"/>
+              <a:gd name="connsiteX18" fmla="*/ 720000 w 1440000"/>
+              <a:gd name="connsiteY18" fmla="*/ 0 h 1889650"/>
+            </a:gdLst>
+            <a:ahLst/>
+            <a:cxnLst>
+              <a:cxn ang="0">
+                <a:pos x="connsiteX0" y="connsiteY0"/>
+              </a:cxn>
+              <a:cxn ang="0">
+                <a:pos x="connsiteX1" y="connsiteY1"/>
+              </a:cxn>
+              <a:cxn ang="0">
+                <a:pos x="connsiteX2" y="connsiteY2"/>
+              </a:cxn>
+              <a:cxn ang="0">
+                <a:pos x="connsiteX3" y="connsiteY3"/>
+              </a:cxn>
+              <a:cxn ang="0">
+                <a:pos x="connsiteX4" y="connsiteY4"/>
+              </a:cxn>
+              <a:cxn ang="0">
+                <a:pos x="connsiteX5" y="connsiteY5"/>
+              </a:cxn>
+              <a:cxn ang="0">
+                <a:pos x="connsiteX6" y="connsiteY6"/>
+              </a:cxn>
+              <a:cxn ang="0">
+                <a:pos x="connsiteX7" y="connsiteY7"/>
+              </a:cxn>
+              <a:cxn ang="0">
+                <a:pos x="connsiteX8" y="connsiteY8"/>
+              </a:cxn>
+              <a:cxn ang="0">
+                <a:pos x="connsiteX9" y="connsiteY9"/>
+              </a:cxn>
+              <a:cxn ang="0">
+                <a:pos x="connsiteX10" y="connsiteY10"/>
+              </a:cxn>
+              <a:cxn ang="0">
+                <a:pos x="connsiteX11" y="connsiteY11"/>
+              </a:cxn>
+              <a:cxn ang="0">
+                <a:pos x="connsiteX12" y="connsiteY12"/>
+              </a:cxn>
+              <a:cxn ang="0">
+                <a:pos x="connsiteX13" y="connsiteY13"/>
+              </a:cxn>
+              <a:cxn ang="0">
+                <a:pos x="connsiteX14" y="connsiteY14"/>
+              </a:cxn>
+              <a:cxn ang="0">
+                <a:pos x="connsiteX15" y="connsiteY15"/>
+              </a:cxn>
+              <a:cxn ang="0">
+                <a:pos x="connsiteX16" y="connsiteY16"/>
+              </a:cxn>
+              <a:cxn ang="0">
+                <a:pos x="connsiteX17" y="connsiteY17"/>
+              </a:cxn>
+              <a:cxn ang="0">
+                <a:pos x="connsiteX18" y="connsiteY18"/>
+              </a:cxn>
+            </a:cxnLst>
+            <a:rect l="l" t="t" r="r" b="b"/>
+            <a:pathLst>
+              <a:path w="1440000" h="1889650">
+                <a:moveTo>
+                  <a:pt x="720000" y="0"/>
+                </a:moveTo>
+                <a:cubicBezTo>
+                  <a:pt x="918823" y="0"/>
+                  <a:pt x="1080000" y="161177"/>
+                  <a:pt x="1080000" y="360000"/>
+                </a:cubicBezTo>
+                <a:cubicBezTo>
+                  <a:pt x="1080000" y="384853"/>
+                  <a:pt x="1077482" y="409118"/>
+                  <a:pt x="1072686" y="432553"/>
+                </a:cubicBezTo>
+                <a:lnTo>
+                  <a:pt x="1067379" y="449650"/>
+                </a:lnTo>
+                <a:lnTo>
+                  <a:pt x="1440000" y="449650"/>
+                </a:lnTo>
+                <a:lnTo>
+                  <a:pt x="1440000" y="822271"/>
+                </a:lnTo>
+                <a:lnTo>
+                  <a:pt x="1422903" y="816964"/>
+                </a:lnTo>
+                <a:cubicBezTo>
+                  <a:pt x="1399468" y="812169"/>
+                  <a:pt x="1375203" y="809650"/>
+                  <a:pt x="1350350" y="809650"/>
+                </a:cubicBezTo>
+                <a:cubicBezTo>
+                  <a:pt x="1151527" y="809650"/>
+                  <a:pt x="990350" y="970827"/>
+                  <a:pt x="990350" y="1169650"/>
+                </a:cubicBezTo>
+                <a:cubicBezTo>
+                  <a:pt x="990350" y="1368473"/>
+                  <a:pt x="1151527" y="1529650"/>
+                  <a:pt x="1350350" y="1529650"/>
+                </a:cubicBezTo>
+                <a:cubicBezTo>
+                  <a:pt x="1375203" y="1529650"/>
+                  <a:pt x="1399468" y="1527132"/>
+                  <a:pt x="1422903" y="1522336"/>
+                </a:cubicBezTo>
+                <a:lnTo>
+                  <a:pt x="1440000" y="1517029"/>
+                </a:lnTo>
+                <a:lnTo>
+                  <a:pt x="1440000" y="1889650"/>
+                </a:lnTo>
+                <a:lnTo>
+                  <a:pt x="0" y="1889650"/>
+                </a:lnTo>
+                <a:lnTo>
+                  <a:pt x="0" y="449650"/>
+                </a:lnTo>
+                <a:lnTo>
+                  <a:pt x="372621" y="449650"/>
+                </a:lnTo>
+                <a:lnTo>
+                  <a:pt x="367314" y="432553"/>
+                </a:lnTo>
+                <a:cubicBezTo>
+                  <a:pt x="362519" y="409118"/>
+                  <a:pt x="360000" y="384853"/>
+                  <a:pt x="360000" y="360000"/>
+                </a:cubicBezTo>
+                <a:cubicBezTo>
+                  <a:pt x="360000" y="161177"/>
+                  <a:pt x="521177" y="0"/>
+                  <a:pt x="720000" y="0"/>
+                </a:cubicBezTo>
+                <a:close/>
+              </a:path>
+            </a:pathLst>
+          </a:custGeom>
+          <a:noFill/>
+          <a:ln/>
+        </p:spPr>
+        <p:style>
+          <a:lnRef idx="2">
+            <a:schemeClr val="accent4"/>
+          </a:lnRef>
+          <a:fillRef idx="1">
+            <a:schemeClr val="lt1"/>
+          </a:fillRef>
+          <a:effectRef idx="0">
+            <a:schemeClr val="accent4"/>
+          </a:effectRef>
+          <a:fontRef idx="minor">
+            <a:schemeClr val="dk1"/>
+          </a:fontRef>
+        </p:style>
+        <p:txBody>
+          <a:bodyPr vert="vert" rtlCol="0" anchor="ctr"/>
+          <a:lstStyle/>
+          <a:p>
+            <a:pPr algn="ctr"/>
+            <a:endParaRPr lang="de-DE" dirty="0">
+              <a:solidFill>
+                <a:schemeClr val="tx1"/>
+              </a:solidFill>
+            </a:endParaRPr>
+          </a:p>
+        </p:txBody>
+      </p:sp>
+      <p:pic>
+        <p:nvPicPr>
+          <p:cNvPr id="45" name="Grafik 44" descr="Übertragen">
+            <a:extLst>
+              <a:ext uri="{FF2B5EF4-FFF2-40B4-BE49-F238E27FC236}">
+                <a16:creationId xmlns:a16="http://schemas.microsoft.com/office/drawing/2014/main" id="{13188411-778F-45C6-B24A-F5656FE04B69}"/>
+              </a:ext>
+            </a:extLst>
+          </p:cNvPr>
+          <p:cNvPicPr>
+            <a:picLocks noChangeAspect="1"/>
+          </p:cNvPicPr>
+          <p:nvPr/>
+        </p:nvPicPr>
+        <p:blipFill>
+          <a:blip r:embed="rId2">
+            <a:extLst>
+              <a:ext uri="{28A0092B-C50C-407E-A947-70E740481C1C}">
+                <a14:useLocalDpi xmlns:a14="http://schemas.microsoft.com/office/drawing/2010/main" val="0"/>
+              </a:ext>
+              <a:ext uri="{96DAC541-7B7A-43D3-8B79-37D633B846F1}">
+                <asvg:svgBlip xmlns:asvg="http://schemas.microsoft.com/office/drawing/2016/SVG/main" r:embed="rId3"/>
+              </a:ext>
+            </a:extLst>
+          </a:blip>
+          <a:stretch>
+            <a:fillRect/>
+          </a:stretch>
+        </p:blipFill>
+        <p:spPr>
+          <a:xfrm>
+            <a:off x="1407303" y="2383424"/>
+            <a:ext cx="667720" cy="667720"/>
+          </a:xfrm>
+          <a:prstGeom prst="rect">
+            <a:avLst/>
+          </a:prstGeom>
+        </p:spPr>
+      </p:pic>
+      <p:pic>
+        <p:nvPicPr>
+          <p:cNvPr id="39" name="Grafik 38" descr="Entsperren">
+            <a:extLst>
+              <a:ext uri="{FF2B5EF4-FFF2-40B4-BE49-F238E27FC236}">
+                <a16:creationId xmlns:a16="http://schemas.microsoft.com/office/drawing/2014/main" id="{0497F4F2-4E99-4A0C-9560-8474E790B300}"/>
+              </a:ext>
+            </a:extLst>
+          </p:cNvPr>
+          <p:cNvPicPr>
+            <a:picLocks noChangeAspect="1"/>
+          </p:cNvPicPr>
+          <p:nvPr/>
+        </p:nvPicPr>
+        <p:blipFill>
+          <a:blip r:embed="rId4">
+            <a:extLst>
+              <a:ext uri="{28A0092B-C50C-407E-A947-70E740481C1C}">
+                <a14:useLocalDpi xmlns:a14="http://schemas.microsoft.com/office/drawing/2010/main" val="0"/>
+              </a:ext>
+              <a:ext uri="{96DAC541-7B7A-43D3-8B79-37D633B846F1}">
+                <asvg:svgBlip xmlns:asvg="http://schemas.microsoft.com/office/drawing/2016/SVG/main" r:embed="rId5"/>
+              </a:ext>
+            </a:extLst>
+          </a:blip>
+          <a:stretch>
+            <a:fillRect/>
+          </a:stretch>
+        </p:blipFill>
+        <p:spPr>
+          <a:xfrm>
+            <a:off x="2828162" y="1007301"/>
+            <a:ext cx="721712" cy="721712"/>
+          </a:xfrm>
+          <a:prstGeom prst="rect">
+            <a:avLst/>
+          </a:prstGeom>
+        </p:spPr>
+      </p:pic>
+      <p:pic>
+        <p:nvPicPr>
+          <p:cNvPr id="43" name="Grafik 42" descr="Recycling-Schild">
+            <a:extLst>
+              <a:ext uri="{FF2B5EF4-FFF2-40B4-BE49-F238E27FC236}">
+                <a16:creationId xmlns:a16="http://schemas.microsoft.com/office/drawing/2014/main" id="{E08D0898-47D6-4F2C-8331-A2C64D6F1824}"/>
+              </a:ext>
+            </a:extLst>
+          </p:cNvPr>
+          <p:cNvPicPr>
+            <a:picLocks noChangeAspect="1"/>
+          </p:cNvPicPr>
+          <p:nvPr/>
+        </p:nvPicPr>
+        <p:blipFill>
+          <a:blip r:embed="rId6">
+            <a:extLst>
+              <a:ext uri="{28A0092B-C50C-407E-A947-70E740481C1C}">
+                <a14:useLocalDpi xmlns:a14="http://schemas.microsoft.com/office/drawing/2010/main" val="0"/>
+              </a:ext>
+              <a:ext uri="{96DAC541-7B7A-43D3-8B79-37D633B846F1}">
+                <asvg:svgBlip xmlns:asvg="http://schemas.microsoft.com/office/drawing/2016/SVG/main" r:embed="rId7"/>
+              </a:ext>
+            </a:extLst>
+          </a:blip>
+          <a:stretch>
+            <a:fillRect/>
+          </a:stretch>
+        </p:blipFill>
+        <p:spPr>
+          <a:xfrm>
+            <a:off x="2935598" y="2457514"/>
+            <a:ext cx="519540" cy="519540"/>
+          </a:xfrm>
+          <a:prstGeom prst="rect">
+            <a:avLst/>
+          </a:prstGeom>
+        </p:spPr>
+      </p:pic>
+      <p:pic>
+        <p:nvPicPr>
+          <p:cNvPr id="37" name="Grafik 36" descr="Lupe">
+            <a:extLst>
+              <a:ext uri="{FF2B5EF4-FFF2-40B4-BE49-F238E27FC236}">
+                <a16:creationId xmlns:a16="http://schemas.microsoft.com/office/drawing/2014/main" id="{4AB3247A-34BC-46F8-B361-3F9F49C4F340}"/>
+              </a:ext>
+            </a:extLst>
+          </p:cNvPr>
+          <p:cNvPicPr>
+            <a:picLocks noChangeAspect="1"/>
+          </p:cNvPicPr>
+          <p:nvPr/>
+        </p:nvPicPr>
+        <p:blipFill>
+          <a:blip r:embed="rId8">
+            <a:extLst>
+              <a:ext uri="{28A0092B-C50C-407E-A947-70E740481C1C}">
+                <a14:useLocalDpi xmlns:a14="http://schemas.microsoft.com/office/drawing/2010/main" val="0"/>
+              </a:ext>
+              <a:ext uri="{96DAC541-7B7A-43D3-8B79-37D633B846F1}">
+                <asvg:svgBlip xmlns:asvg="http://schemas.microsoft.com/office/drawing/2016/SVG/main" r:embed="rId9"/>
+              </a:ext>
+            </a:extLst>
+          </a:blip>
+          <a:stretch>
+            <a:fillRect/>
+          </a:stretch>
+        </p:blipFill>
+        <p:spPr>
+          <a:xfrm>
+            <a:off x="1544720" y="1047731"/>
+            <a:ext cx="506994" cy="506994"/>
+          </a:xfrm>
+          <a:prstGeom prst="rect">
+            <a:avLst/>
+          </a:prstGeom>
+        </p:spPr>
+      </p:pic>
+      <p:sp>
+        <p:nvSpPr>
+          <p:cNvPr id="32" name="Textfeld 31">
+            <a:extLst>
+              <a:ext uri="{FF2B5EF4-FFF2-40B4-BE49-F238E27FC236}">
+                <a16:creationId xmlns:a16="http://schemas.microsoft.com/office/drawing/2014/main" id="{BEE865C9-32E1-4F57-8B78-B2247BA51485}"/>
+              </a:ext>
+            </a:extLst>
+          </p:cNvPr>
+          <p:cNvSpPr txBox="1"/>
+          <p:nvPr/>
+        </p:nvSpPr>
+        <p:spPr>
+          <a:xfrm>
+            <a:off x="1603463" y="1082370"/>
+            <a:ext cx="312421" cy="369332"/>
+          </a:xfrm>
+          <a:prstGeom prst="rect">
+            <a:avLst/>
+          </a:prstGeom>
+          <a:noFill/>
+        </p:spPr>
+        <p:txBody>
+          <a:bodyPr wrap="square" rtlCol="0">
+            <a:spAutoFit/>
+          </a:bodyPr>
+          <a:lstStyle/>
+          <a:p>
+            <a:r>
+              <a:rPr lang="de-DE" dirty="0"/>
+              <a:t>F</a:t>
+            </a:r>
+          </a:p>
+        </p:txBody>
+      </p:sp>
+      <p:sp>
+        <p:nvSpPr>
+          <p:cNvPr id="33" name="Textfeld 32">
+            <a:extLst>
+              <a:ext uri="{FF2B5EF4-FFF2-40B4-BE49-F238E27FC236}">
+                <a16:creationId xmlns:a16="http://schemas.microsoft.com/office/drawing/2014/main" id="{D3DAD1F3-EC06-4EC6-9EEE-F9FA07CF9A33}"/>
+              </a:ext>
+            </a:extLst>
+          </p:cNvPr>
+          <p:cNvSpPr txBox="1"/>
+          <p:nvPr/>
+        </p:nvSpPr>
+        <p:spPr>
+          <a:xfrm>
+            <a:off x="3034850" y="1082370"/>
+            <a:ext cx="312421" cy="369332"/>
+          </a:xfrm>
+          <a:prstGeom prst="rect">
+            <a:avLst/>
+          </a:prstGeom>
+          <a:noFill/>
+        </p:spPr>
+        <p:txBody>
+          <a:bodyPr wrap="square" rtlCol="0">
+            <a:spAutoFit/>
+          </a:bodyPr>
+          <a:lstStyle/>
+          <a:p>
+            <a:r>
+              <a:rPr lang="de-DE" dirty="0"/>
+              <a:t>A</a:t>
+            </a:r>
+          </a:p>
+        </p:txBody>
+      </p:sp>
+      <p:sp>
+        <p:nvSpPr>
+          <p:cNvPr id="34" name="Textfeld 33">
+            <a:extLst>
+              <a:ext uri="{FF2B5EF4-FFF2-40B4-BE49-F238E27FC236}">
+                <a16:creationId xmlns:a16="http://schemas.microsoft.com/office/drawing/2014/main" id="{B3A7C55B-0FB7-4017-97BC-B81E0D6BAFFF}"/>
+              </a:ext>
+            </a:extLst>
+          </p:cNvPr>
+          <p:cNvSpPr txBox="1"/>
+          <p:nvPr/>
+        </p:nvSpPr>
+        <p:spPr>
+          <a:xfrm>
+            <a:off x="1626482" y="2538482"/>
+            <a:ext cx="312421" cy="369332"/>
+          </a:xfrm>
+          <a:prstGeom prst="rect">
+            <a:avLst/>
+          </a:prstGeom>
+          <a:noFill/>
+        </p:spPr>
+        <p:txBody>
+          <a:bodyPr wrap="square" rtlCol="0">
+            <a:spAutoFit/>
+          </a:bodyPr>
+          <a:lstStyle/>
+          <a:p>
+            <a:r>
+              <a:rPr lang="de-DE" dirty="0"/>
+              <a:t>I</a:t>
+            </a:r>
+          </a:p>
+        </p:txBody>
+      </p:sp>
+      <p:sp>
+        <p:nvSpPr>
+          <p:cNvPr id="35" name="Textfeld 34">
+            <a:extLst>
+              <a:ext uri="{FF2B5EF4-FFF2-40B4-BE49-F238E27FC236}">
+                <a16:creationId xmlns:a16="http://schemas.microsoft.com/office/drawing/2014/main" id="{F90364D0-7A30-4692-B1D5-FE14EDB67AAC}"/>
+              </a:ext>
+            </a:extLst>
+          </p:cNvPr>
+          <p:cNvSpPr txBox="1"/>
+          <p:nvPr/>
+        </p:nvSpPr>
+        <p:spPr>
+          <a:xfrm>
+            <a:off x="3034850" y="2541657"/>
+            <a:ext cx="312421" cy="369332"/>
+          </a:xfrm>
+          <a:prstGeom prst="rect">
+            <a:avLst/>
+          </a:prstGeom>
+          <a:noFill/>
+        </p:spPr>
+        <p:txBody>
+          <a:bodyPr wrap="square" rtlCol="0">
+            <a:spAutoFit/>
+          </a:bodyPr>
+          <a:lstStyle/>
+          <a:p>
+            <a:r>
+              <a:rPr lang="de-DE" dirty="0"/>
+              <a:t>R</a:t>
+            </a:r>
+          </a:p>
+        </p:txBody>
+      </p:sp>
+      <p:sp>
+        <p:nvSpPr>
+          <p:cNvPr id="50" name="Freihandform: Form 49">
+            <a:extLst>
+              <a:ext uri="{FF2B5EF4-FFF2-40B4-BE49-F238E27FC236}">
+                <a16:creationId xmlns:a16="http://schemas.microsoft.com/office/drawing/2014/main" id="{7C2652EE-712E-4BEA-9295-34419F768AA7}"/>
+              </a:ext>
+            </a:extLst>
+          </p:cNvPr>
+          <p:cNvSpPr/>
+          <p:nvPr/>
+        </p:nvSpPr>
+        <p:spPr>
+          <a:xfrm rot="5400000">
+            <a:off x="9431774" y="1764175"/>
+            <a:ext cx="1440000" cy="1889650"/>
+          </a:xfrm>
+          <a:custGeom>
+            <a:avLst/>
+            <a:gdLst>
+              <a:gd name="connsiteX0" fmla="*/ 720000 w 1440000"/>
+              <a:gd name="connsiteY0" fmla="*/ 0 h 1889650"/>
+              <a:gd name="connsiteX1" fmla="*/ 1080000 w 1440000"/>
+              <a:gd name="connsiteY1" fmla="*/ 360000 h 1889650"/>
+              <a:gd name="connsiteX2" fmla="*/ 1072686 w 1440000"/>
+              <a:gd name="connsiteY2" fmla="*/ 432553 h 1889650"/>
+              <a:gd name="connsiteX3" fmla="*/ 1067379 w 1440000"/>
+              <a:gd name="connsiteY3" fmla="*/ 449650 h 1889650"/>
+              <a:gd name="connsiteX4" fmla="*/ 1440000 w 1440000"/>
+              <a:gd name="connsiteY4" fmla="*/ 449650 h 1889650"/>
+              <a:gd name="connsiteX5" fmla="*/ 1440000 w 1440000"/>
+              <a:gd name="connsiteY5" fmla="*/ 822271 h 1889650"/>
+              <a:gd name="connsiteX6" fmla="*/ 1422903 w 1440000"/>
+              <a:gd name="connsiteY6" fmla="*/ 816964 h 1889650"/>
+              <a:gd name="connsiteX7" fmla="*/ 1350350 w 1440000"/>
+              <a:gd name="connsiteY7" fmla="*/ 809650 h 1889650"/>
+              <a:gd name="connsiteX8" fmla="*/ 990350 w 1440000"/>
+              <a:gd name="connsiteY8" fmla="*/ 1169650 h 1889650"/>
+              <a:gd name="connsiteX9" fmla="*/ 1350350 w 1440000"/>
+              <a:gd name="connsiteY9" fmla="*/ 1529650 h 1889650"/>
+              <a:gd name="connsiteX10" fmla="*/ 1422903 w 1440000"/>
+              <a:gd name="connsiteY10" fmla="*/ 1522336 h 1889650"/>
+              <a:gd name="connsiteX11" fmla="*/ 1440000 w 1440000"/>
+              <a:gd name="connsiteY11" fmla="*/ 1517029 h 1889650"/>
+              <a:gd name="connsiteX12" fmla="*/ 1440000 w 1440000"/>
+              <a:gd name="connsiteY12" fmla="*/ 1889650 h 1889650"/>
+              <a:gd name="connsiteX13" fmla="*/ 0 w 1440000"/>
+              <a:gd name="connsiteY13" fmla="*/ 1889650 h 1889650"/>
+              <a:gd name="connsiteX14" fmla="*/ 0 w 1440000"/>
+              <a:gd name="connsiteY14" fmla="*/ 449650 h 1889650"/>
+              <a:gd name="connsiteX15" fmla="*/ 372621 w 1440000"/>
+              <a:gd name="connsiteY15" fmla="*/ 449650 h 1889650"/>
+              <a:gd name="connsiteX16" fmla="*/ 367314 w 1440000"/>
+              <a:gd name="connsiteY16" fmla="*/ 432553 h 1889650"/>
+              <a:gd name="connsiteX17" fmla="*/ 360000 w 1440000"/>
+              <a:gd name="connsiteY17" fmla="*/ 360000 h 1889650"/>
+              <a:gd name="connsiteX18" fmla="*/ 720000 w 1440000"/>
+              <a:gd name="connsiteY18" fmla="*/ 0 h 1889650"/>
+            </a:gdLst>
+            <a:ahLst/>
+            <a:cxnLst>
+              <a:cxn ang="0">
+                <a:pos x="connsiteX0" y="connsiteY0"/>
+              </a:cxn>
+              <a:cxn ang="0">
+                <a:pos x="connsiteX1" y="connsiteY1"/>
+              </a:cxn>
+              <a:cxn ang="0">
+                <a:pos x="connsiteX2" y="connsiteY2"/>
+              </a:cxn>
+              <a:cxn ang="0">
+                <a:pos x="connsiteX3" y="connsiteY3"/>
+              </a:cxn>
+              <a:cxn ang="0">
+                <a:pos x="connsiteX4" y="connsiteY4"/>
+              </a:cxn>
+              <a:cxn ang="0">
+                <a:pos x="connsiteX5" y="connsiteY5"/>
+              </a:cxn>
+              <a:cxn ang="0">
+                <a:pos x="connsiteX6" y="connsiteY6"/>
+              </a:cxn>
+              <a:cxn ang="0">
+                <a:pos x="connsiteX7" y="connsiteY7"/>
+              </a:cxn>
+              <a:cxn ang="0">
+                <a:pos x="connsiteX8" y="connsiteY8"/>
+              </a:cxn>
+              <a:cxn ang="0">
+                <a:pos x="connsiteX9" y="connsiteY9"/>
+              </a:cxn>
+              <a:cxn ang="0">
+                <a:pos x="connsiteX10" y="connsiteY10"/>
+              </a:cxn>
+              <a:cxn ang="0">
+                <a:pos x="connsiteX11" y="connsiteY11"/>
+              </a:cxn>
+              <a:cxn ang="0">
+                <a:pos x="connsiteX12" y="connsiteY12"/>
+              </a:cxn>
+              <a:cxn ang="0">
+                <a:pos x="connsiteX13" y="connsiteY13"/>
+              </a:cxn>
+              <a:cxn ang="0">
+                <a:pos x="connsiteX14" y="connsiteY14"/>
+              </a:cxn>
+              <a:cxn ang="0">
+                <a:pos x="connsiteX15" y="connsiteY15"/>
+              </a:cxn>
+              <a:cxn ang="0">
+                <a:pos x="connsiteX16" y="connsiteY16"/>
+              </a:cxn>
+              <a:cxn ang="0">
+                <a:pos x="connsiteX17" y="connsiteY17"/>
+              </a:cxn>
+              <a:cxn ang="0">
+                <a:pos x="connsiteX18" y="connsiteY18"/>
+              </a:cxn>
+            </a:cxnLst>
+            <a:rect l="l" t="t" r="r" b="b"/>
+            <a:pathLst>
+              <a:path w="1440000" h="1889650">
+                <a:moveTo>
+                  <a:pt x="720000" y="0"/>
+                </a:moveTo>
+                <a:cubicBezTo>
+                  <a:pt x="918823" y="0"/>
+                  <a:pt x="1080000" y="161177"/>
+                  <a:pt x="1080000" y="360000"/>
+                </a:cubicBezTo>
+                <a:cubicBezTo>
+                  <a:pt x="1080000" y="384853"/>
+                  <a:pt x="1077482" y="409118"/>
+                  <a:pt x="1072686" y="432553"/>
+                </a:cubicBezTo>
+                <a:lnTo>
+                  <a:pt x="1067379" y="449650"/>
+                </a:lnTo>
+                <a:lnTo>
+                  <a:pt x="1440000" y="449650"/>
+                </a:lnTo>
+                <a:lnTo>
+                  <a:pt x="1440000" y="822271"/>
+                </a:lnTo>
+                <a:lnTo>
+                  <a:pt x="1422903" y="816964"/>
+                </a:lnTo>
+                <a:cubicBezTo>
+                  <a:pt x="1399468" y="812169"/>
+                  <a:pt x="1375203" y="809650"/>
+                  <a:pt x="1350350" y="809650"/>
+                </a:cubicBezTo>
+                <a:cubicBezTo>
+                  <a:pt x="1151527" y="809650"/>
+                  <a:pt x="990350" y="970827"/>
+                  <a:pt x="990350" y="1169650"/>
+                </a:cubicBezTo>
+                <a:cubicBezTo>
+                  <a:pt x="990350" y="1368473"/>
+                  <a:pt x="1151527" y="1529650"/>
+                  <a:pt x="1350350" y="1529650"/>
+                </a:cubicBezTo>
+                <a:cubicBezTo>
+                  <a:pt x="1375203" y="1529650"/>
+                  <a:pt x="1399468" y="1527132"/>
+                  <a:pt x="1422903" y="1522336"/>
+                </a:cubicBezTo>
+                <a:lnTo>
+                  <a:pt x="1440000" y="1517029"/>
+                </a:lnTo>
+                <a:lnTo>
+                  <a:pt x="1440000" y="1889650"/>
+                </a:lnTo>
+                <a:lnTo>
+                  <a:pt x="0" y="1889650"/>
+                </a:lnTo>
+                <a:lnTo>
+                  <a:pt x="0" y="449650"/>
+                </a:lnTo>
+                <a:lnTo>
+                  <a:pt x="372621" y="449650"/>
+                </a:lnTo>
+                <a:lnTo>
+                  <a:pt x="367314" y="432553"/>
+                </a:lnTo>
+                <a:cubicBezTo>
+                  <a:pt x="362519" y="409118"/>
+                  <a:pt x="360000" y="384853"/>
+                  <a:pt x="360000" y="360000"/>
+                </a:cubicBezTo>
+                <a:cubicBezTo>
+                  <a:pt x="360000" y="161177"/>
+                  <a:pt x="521177" y="0"/>
+                  <a:pt x="720000" y="0"/>
+                </a:cubicBezTo>
+                <a:close/>
+              </a:path>
+            </a:pathLst>
+          </a:custGeom>
+          <a:ln/>
+        </p:spPr>
+        <p:style>
+          <a:lnRef idx="2">
+            <a:schemeClr val="accent2">
+              <a:shade val="50000"/>
+            </a:schemeClr>
+          </a:lnRef>
+          <a:fillRef idx="1">
+            <a:schemeClr val="accent2"/>
+          </a:fillRef>
+          <a:effectRef idx="0">
+            <a:schemeClr val="accent2"/>
+          </a:effectRef>
+          <a:fontRef idx="minor">
+            <a:schemeClr val="lt1"/>
+          </a:fontRef>
+        </p:style>
+        <p:txBody>
+          <a:bodyPr vert="vert270" rtlCol="0" anchor="ctr"/>
+          <a:lstStyle/>
+          <a:p>
+            <a:pPr algn="ctr"/>
+            <a:endParaRPr lang="de-DE" dirty="0">
+              <a:solidFill>
+                <a:schemeClr val="tx1"/>
+              </a:solidFill>
+            </a:endParaRPr>
+          </a:p>
+        </p:txBody>
+      </p:sp>
+      <p:sp>
+        <p:nvSpPr>
+          <p:cNvPr id="51" name="Freihandform: Form 50">
+            <a:extLst>
+              <a:ext uri="{FF2B5EF4-FFF2-40B4-BE49-F238E27FC236}">
+                <a16:creationId xmlns:a16="http://schemas.microsoft.com/office/drawing/2014/main" id="{1442EC82-A584-470E-8E69-19B6F35F3CFA}"/>
+              </a:ext>
+            </a:extLst>
+          </p:cNvPr>
+          <p:cNvSpPr/>
+          <p:nvPr/>
+        </p:nvSpPr>
+        <p:spPr>
+          <a:xfrm rot="10800000">
+            <a:off x="10651036" y="1989000"/>
+            <a:ext cx="1440000" cy="1889650"/>
+          </a:xfrm>
+          <a:custGeom>
+            <a:avLst/>
+            <a:gdLst>
+              <a:gd name="connsiteX0" fmla="*/ 720000 w 1440000"/>
+              <a:gd name="connsiteY0" fmla="*/ 0 h 1889650"/>
+              <a:gd name="connsiteX1" fmla="*/ 1080000 w 1440000"/>
+              <a:gd name="connsiteY1" fmla="*/ 360000 h 1889650"/>
+              <a:gd name="connsiteX2" fmla="*/ 1072686 w 1440000"/>
+              <a:gd name="connsiteY2" fmla="*/ 432553 h 1889650"/>
+              <a:gd name="connsiteX3" fmla="*/ 1067379 w 1440000"/>
+              <a:gd name="connsiteY3" fmla="*/ 449650 h 1889650"/>
+              <a:gd name="connsiteX4" fmla="*/ 1440000 w 1440000"/>
+              <a:gd name="connsiteY4" fmla="*/ 449650 h 1889650"/>
+              <a:gd name="connsiteX5" fmla="*/ 1440000 w 1440000"/>
+              <a:gd name="connsiteY5" fmla="*/ 822271 h 1889650"/>
+              <a:gd name="connsiteX6" fmla="*/ 1422903 w 1440000"/>
+              <a:gd name="connsiteY6" fmla="*/ 816964 h 1889650"/>
+              <a:gd name="connsiteX7" fmla="*/ 1350350 w 1440000"/>
+              <a:gd name="connsiteY7" fmla="*/ 809650 h 1889650"/>
+              <a:gd name="connsiteX8" fmla="*/ 990350 w 1440000"/>
+              <a:gd name="connsiteY8" fmla="*/ 1169650 h 1889650"/>
+              <a:gd name="connsiteX9" fmla="*/ 1350350 w 1440000"/>
+              <a:gd name="connsiteY9" fmla="*/ 1529650 h 1889650"/>
+              <a:gd name="connsiteX10" fmla="*/ 1422903 w 1440000"/>
+              <a:gd name="connsiteY10" fmla="*/ 1522336 h 1889650"/>
+              <a:gd name="connsiteX11" fmla="*/ 1440000 w 1440000"/>
+              <a:gd name="connsiteY11" fmla="*/ 1517029 h 1889650"/>
+              <a:gd name="connsiteX12" fmla="*/ 1440000 w 1440000"/>
+              <a:gd name="connsiteY12" fmla="*/ 1889650 h 1889650"/>
+              <a:gd name="connsiteX13" fmla="*/ 0 w 1440000"/>
+              <a:gd name="connsiteY13" fmla="*/ 1889650 h 1889650"/>
+              <a:gd name="connsiteX14" fmla="*/ 0 w 1440000"/>
+              <a:gd name="connsiteY14" fmla="*/ 449650 h 1889650"/>
+              <a:gd name="connsiteX15" fmla="*/ 372621 w 1440000"/>
+              <a:gd name="connsiteY15" fmla="*/ 449650 h 1889650"/>
+              <a:gd name="connsiteX16" fmla="*/ 367314 w 1440000"/>
+              <a:gd name="connsiteY16" fmla="*/ 432553 h 1889650"/>
+              <a:gd name="connsiteX17" fmla="*/ 360000 w 1440000"/>
+              <a:gd name="connsiteY17" fmla="*/ 360000 h 1889650"/>
+              <a:gd name="connsiteX18" fmla="*/ 720000 w 1440000"/>
+              <a:gd name="connsiteY18" fmla="*/ 0 h 1889650"/>
+            </a:gdLst>
+            <a:ahLst/>
+            <a:cxnLst>
+              <a:cxn ang="0">
+                <a:pos x="connsiteX0" y="connsiteY0"/>
+              </a:cxn>
+              <a:cxn ang="0">
+                <a:pos x="connsiteX1" y="connsiteY1"/>
+              </a:cxn>
+              <a:cxn ang="0">
+                <a:pos x="connsiteX2" y="connsiteY2"/>
+              </a:cxn>
+              <a:cxn ang="0">
+                <a:pos x="connsiteX3" y="connsiteY3"/>
+              </a:cxn>
+              <a:cxn ang="0">
+                <a:pos x="connsiteX4" y="connsiteY4"/>
+              </a:cxn>
+              <a:cxn ang="0">
+                <a:pos x="connsiteX5" y="connsiteY5"/>
+              </a:cxn>
+              <a:cxn ang="0">
+                <a:pos x="connsiteX6" y="connsiteY6"/>
+              </a:cxn>
+              <a:cxn ang="0">
+                <a:pos x="connsiteX7" y="connsiteY7"/>
+              </a:cxn>
+              <a:cxn ang="0">
+                <a:pos x="connsiteX8" y="connsiteY8"/>
+              </a:cxn>
+              <a:cxn ang="0">
+                <a:pos x="connsiteX9" y="connsiteY9"/>
+              </a:cxn>
+              <a:cxn ang="0">
+                <a:pos x="connsiteX10" y="connsiteY10"/>
+              </a:cxn>
+              <a:cxn ang="0">
+                <a:pos x="connsiteX11" y="connsiteY11"/>
+              </a:cxn>
+              <a:cxn ang="0">
+                <a:pos x="connsiteX12" y="connsiteY12"/>
+              </a:cxn>
+              <a:cxn ang="0">
+                <a:pos x="connsiteX13" y="connsiteY13"/>
+              </a:cxn>
+              <a:cxn ang="0">
+                <a:pos x="connsiteX14" y="connsiteY14"/>
+              </a:cxn>
+              <a:cxn ang="0">
+                <a:pos x="connsiteX15" y="connsiteY15"/>
+              </a:cxn>
+              <a:cxn ang="0">
+                <a:pos x="connsiteX16" y="connsiteY16"/>
+              </a:cxn>
+              <a:cxn ang="0">
+                <a:pos x="connsiteX17" y="connsiteY17"/>
+              </a:cxn>
+              <a:cxn ang="0">
+                <a:pos x="connsiteX18" y="connsiteY18"/>
+              </a:cxn>
+            </a:cxnLst>
+            <a:rect l="l" t="t" r="r" b="b"/>
+            <a:pathLst>
+              <a:path w="1440000" h="1889650">
+                <a:moveTo>
+                  <a:pt x="720000" y="0"/>
+                </a:moveTo>
+                <a:cubicBezTo>
+                  <a:pt x="918823" y="0"/>
+                  <a:pt x="1080000" y="161177"/>
+                  <a:pt x="1080000" y="360000"/>
+                </a:cubicBezTo>
+                <a:cubicBezTo>
+                  <a:pt x="1080000" y="384853"/>
+                  <a:pt x="1077482" y="409118"/>
+                  <a:pt x="1072686" y="432553"/>
+                </a:cubicBezTo>
+                <a:lnTo>
+                  <a:pt x="1067379" y="449650"/>
+                </a:lnTo>
+                <a:lnTo>
+                  <a:pt x="1440000" y="449650"/>
+                </a:lnTo>
+                <a:lnTo>
+                  <a:pt x="1440000" y="822271"/>
+                </a:lnTo>
+                <a:lnTo>
+                  <a:pt x="1422903" y="816964"/>
+                </a:lnTo>
+                <a:cubicBezTo>
+                  <a:pt x="1399468" y="812169"/>
+                  <a:pt x="1375203" y="809650"/>
+                  <a:pt x="1350350" y="809650"/>
+                </a:cubicBezTo>
+                <a:cubicBezTo>
+                  <a:pt x="1151527" y="809650"/>
+                  <a:pt x="990350" y="970827"/>
+                  <a:pt x="990350" y="1169650"/>
+                </a:cubicBezTo>
+                <a:cubicBezTo>
+                  <a:pt x="990350" y="1368473"/>
+                  <a:pt x="1151527" y="1529650"/>
+                  <a:pt x="1350350" y="1529650"/>
+                </a:cubicBezTo>
+                <a:cubicBezTo>
+                  <a:pt x="1375203" y="1529650"/>
+                  <a:pt x="1399468" y="1527132"/>
+                  <a:pt x="1422903" y="1522336"/>
+                </a:cubicBezTo>
+                <a:lnTo>
+                  <a:pt x="1440000" y="1517029"/>
+                </a:lnTo>
+                <a:lnTo>
+                  <a:pt x="1440000" y="1889650"/>
+                </a:lnTo>
+                <a:lnTo>
+                  <a:pt x="0" y="1889650"/>
+                </a:lnTo>
+                <a:lnTo>
+                  <a:pt x="0" y="449650"/>
+                </a:lnTo>
+                <a:lnTo>
+                  <a:pt x="372621" y="449650"/>
+                </a:lnTo>
+                <a:lnTo>
+                  <a:pt x="367314" y="432553"/>
+                </a:lnTo>
+                <a:cubicBezTo>
+                  <a:pt x="362519" y="409118"/>
+                  <a:pt x="360000" y="384853"/>
+                  <a:pt x="360000" y="360000"/>
+                </a:cubicBezTo>
+                <a:cubicBezTo>
+                  <a:pt x="360000" y="161177"/>
+                  <a:pt x="521177" y="0"/>
+                  <a:pt x="720000" y="0"/>
+                </a:cubicBezTo>
+                <a:close/>
+              </a:path>
+            </a:pathLst>
+          </a:custGeom>
+          <a:ln/>
+        </p:spPr>
+        <p:style>
+          <a:lnRef idx="2">
+            <a:schemeClr val="accent1">
+              <a:shade val="50000"/>
+            </a:schemeClr>
+          </a:lnRef>
+          <a:fillRef idx="1">
+            <a:schemeClr val="accent1"/>
+          </a:fillRef>
+          <a:effectRef idx="0">
+            <a:schemeClr val="accent1"/>
+          </a:effectRef>
+          <a:fontRef idx="minor">
+            <a:schemeClr val="lt1"/>
+          </a:fontRef>
+        </p:style>
+        <p:txBody>
+          <a:bodyPr vert="horz" rtlCol="0" anchor="ctr"/>
+          <a:lstStyle/>
+          <a:p>
+            <a:pPr algn="ctr"/>
+            <a:endParaRPr lang="de-DE" dirty="0">
+              <a:solidFill>
+                <a:schemeClr val="tx1"/>
+              </a:solidFill>
+            </a:endParaRPr>
+          </a:p>
+        </p:txBody>
+      </p:sp>
+      <p:sp>
+        <p:nvSpPr>
+          <p:cNvPr id="52" name="Freihandform: Form 51">
+            <a:extLst>
+              <a:ext uri="{FF2B5EF4-FFF2-40B4-BE49-F238E27FC236}">
+                <a16:creationId xmlns:a16="http://schemas.microsoft.com/office/drawing/2014/main" id="{6550A689-744B-4203-9542-51C6AB1B6AC3}"/>
+              </a:ext>
+            </a:extLst>
+          </p:cNvPr>
+          <p:cNvSpPr/>
+          <p:nvPr/>
+        </p:nvSpPr>
+        <p:spPr>
+          <a:xfrm>
+            <a:off x="9206949" y="2983250"/>
+            <a:ext cx="1440000" cy="1889650"/>
+          </a:xfrm>
+          <a:custGeom>
+            <a:avLst/>
+            <a:gdLst>
+              <a:gd name="connsiteX0" fmla="*/ 720000 w 1440000"/>
+              <a:gd name="connsiteY0" fmla="*/ 0 h 1889650"/>
+              <a:gd name="connsiteX1" fmla="*/ 1080000 w 1440000"/>
+              <a:gd name="connsiteY1" fmla="*/ 360000 h 1889650"/>
+              <a:gd name="connsiteX2" fmla="*/ 1072686 w 1440000"/>
+              <a:gd name="connsiteY2" fmla="*/ 432553 h 1889650"/>
+              <a:gd name="connsiteX3" fmla="*/ 1067379 w 1440000"/>
+              <a:gd name="connsiteY3" fmla="*/ 449650 h 1889650"/>
+              <a:gd name="connsiteX4" fmla="*/ 1440000 w 1440000"/>
+              <a:gd name="connsiteY4" fmla="*/ 449650 h 1889650"/>
+              <a:gd name="connsiteX5" fmla="*/ 1440000 w 1440000"/>
+              <a:gd name="connsiteY5" fmla="*/ 822271 h 1889650"/>
+              <a:gd name="connsiteX6" fmla="*/ 1422903 w 1440000"/>
+              <a:gd name="connsiteY6" fmla="*/ 816964 h 1889650"/>
+              <a:gd name="connsiteX7" fmla="*/ 1350350 w 1440000"/>
+              <a:gd name="connsiteY7" fmla="*/ 809650 h 1889650"/>
+              <a:gd name="connsiteX8" fmla="*/ 990350 w 1440000"/>
+              <a:gd name="connsiteY8" fmla="*/ 1169650 h 1889650"/>
+              <a:gd name="connsiteX9" fmla="*/ 1350350 w 1440000"/>
+              <a:gd name="connsiteY9" fmla="*/ 1529650 h 1889650"/>
+              <a:gd name="connsiteX10" fmla="*/ 1422903 w 1440000"/>
+              <a:gd name="connsiteY10" fmla="*/ 1522336 h 1889650"/>
+              <a:gd name="connsiteX11" fmla="*/ 1440000 w 1440000"/>
+              <a:gd name="connsiteY11" fmla="*/ 1517029 h 1889650"/>
+              <a:gd name="connsiteX12" fmla="*/ 1440000 w 1440000"/>
+              <a:gd name="connsiteY12" fmla="*/ 1889650 h 1889650"/>
+              <a:gd name="connsiteX13" fmla="*/ 0 w 1440000"/>
+              <a:gd name="connsiteY13" fmla="*/ 1889650 h 1889650"/>
+              <a:gd name="connsiteX14" fmla="*/ 0 w 1440000"/>
+              <a:gd name="connsiteY14" fmla="*/ 449650 h 1889650"/>
+              <a:gd name="connsiteX15" fmla="*/ 372621 w 1440000"/>
+              <a:gd name="connsiteY15" fmla="*/ 449650 h 1889650"/>
+              <a:gd name="connsiteX16" fmla="*/ 367314 w 1440000"/>
+              <a:gd name="connsiteY16" fmla="*/ 432553 h 1889650"/>
+              <a:gd name="connsiteX17" fmla="*/ 360000 w 1440000"/>
+              <a:gd name="connsiteY17" fmla="*/ 360000 h 1889650"/>
+              <a:gd name="connsiteX18" fmla="*/ 720000 w 1440000"/>
+              <a:gd name="connsiteY18" fmla="*/ 0 h 1889650"/>
+            </a:gdLst>
+            <a:ahLst/>
+            <a:cxnLst>
+              <a:cxn ang="0">
+                <a:pos x="connsiteX0" y="connsiteY0"/>
+              </a:cxn>
+              <a:cxn ang="0">
+                <a:pos x="connsiteX1" y="connsiteY1"/>
+              </a:cxn>
+              <a:cxn ang="0">
+                <a:pos x="connsiteX2" y="connsiteY2"/>
+              </a:cxn>
+              <a:cxn ang="0">
+                <a:pos x="connsiteX3" y="connsiteY3"/>
+              </a:cxn>
+              <a:cxn ang="0">
+                <a:pos x="connsiteX4" y="connsiteY4"/>
+              </a:cxn>
+              <a:cxn ang="0">
+                <a:pos x="connsiteX5" y="connsiteY5"/>
+              </a:cxn>
+              <a:cxn ang="0">
+                <a:pos x="connsiteX6" y="connsiteY6"/>
+              </a:cxn>
+              <a:cxn ang="0">
+                <a:pos x="connsiteX7" y="connsiteY7"/>
+              </a:cxn>
+              <a:cxn ang="0">
+                <a:pos x="connsiteX8" y="connsiteY8"/>
+              </a:cxn>
+              <a:cxn ang="0">
+                <a:pos x="connsiteX9" y="connsiteY9"/>
+              </a:cxn>
+              <a:cxn ang="0">
+                <a:pos x="connsiteX10" y="connsiteY10"/>
+              </a:cxn>
+              <a:cxn ang="0">
+                <a:pos x="connsiteX11" y="connsiteY11"/>
+              </a:cxn>
+              <a:cxn ang="0">
+                <a:pos x="connsiteX12" y="connsiteY12"/>
+              </a:cxn>
+              <a:cxn ang="0">
+                <a:pos x="connsiteX13" y="connsiteY13"/>
+              </a:cxn>
+              <a:cxn ang="0">
+                <a:pos x="connsiteX14" y="connsiteY14"/>
+              </a:cxn>
+              <a:cxn ang="0">
+                <a:pos x="connsiteX15" y="connsiteY15"/>
+              </a:cxn>
+              <a:cxn ang="0">
+                <a:pos x="connsiteX16" y="connsiteY16"/>
+              </a:cxn>
+              <a:cxn ang="0">
+                <a:pos x="connsiteX17" y="connsiteY17"/>
+              </a:cxn>
+              <a:cxn ang="0">
+                <a:pos x="connsiteX18" y="connsiteY18"/>
+              </a:cxn>
+            </a:cxnLst>
+            <a:rect l="l" t="t" r="r" b="b"/>
+            <a:pathLst>
+              <a:path w="1440000" h="1889650">
+                <a:moveTo>
+                  <a:pt x="720000" y="0"/>
+                </a:moveTo>
+                <a:cubicBezTo>
+                  <a:pt x="918823" y="0"/>
+                  <a:pt x="1080000" y="161177"/>
+                  <a:pt x="1080000" y="360000"/>
+                </a:cubicBezTo>
+                <a:cubicBezTo>
+                  <a:pt x="1080000" y="384853"/>
+                  <a:pt x="1077482" y="409118"/>
+                  <a:pt x="1072686" y="432553"/>
+                </a:cubicBezTo>
+                <a:lnTo>
+                  <a:pt x="1067379" y="449650"/>
+                </a:lnTo>
+                <a:lnTo>
+                  <a:pt x="1440000" y="449650"/>
+                </a:lnTo>
+                <a:lnTo>
+                  <a:pt x="1440000" y="822271"/>
+                </a:lnTo>
+                <a:lnTo>
+                  <a:pt x="1422903" y="816964"/>
+                </a:lnTo>
+                <a:cubicBezTo>
+                  <a:pt x="1399468" y="812169"/>
+                  <a:pt x="1375203" y="809650"/>
+                  <a:pt x="1350350" y="809650"/>
+                </a:cubicBezTo>
+                <a:cubicBezTo>
+                  <a:pt x="1151527" y="809650"/>
+                  <a:pt x="990350" y="970827"/>
+                  <a:pt x="990350" y="1169650"/>
+                </a:cubicBezTo>
+                <a:cubicBezTo>
+                  <a:pt x="990350" y="1368473"/>
+                  <a:pt x="1151527" y="1529650"/>
+                  <a:pt x="1350350" y="1529650"/>
+                </a:cubicBezTo>
+                <a:cubicBezTo>
+                  <a:pt x="1375203" y="1529650"/>
+                  <a:pt x="1399468" y="1527132"/>
+                  <a:pt x="1422903" y="1522336"/>
+                </a:cubicBezTo>
+                <a:lnTo>
+                  <a:pt x="1440000" y="1517029"/>
+                </a:lnTo>
+                <a:lnTo>
+                  <a:pt x="1440000" y="1889650"/>
+                </a:lnTo>
+                <a:lnTo>
+                  <a:pt x="0" y="1889650"/>
+                </a:lnTo>
+                <a:lnTo>
+                  <a:pt x="0" y="449650"/>
+                </a:lnTo>
+                <a:lnTo>
+                  <a:pt x="372621" y="449650"/>
+                </a:lnTo>
+                <a:lnTo>
+                  <a:pt x="367314" y="432553"/>
+                </a:lnTo>
+                <a:cubicBezTo>
+                  <a:pt x="362519" y="409118"/>
+                  <a:pt x="360000" y="384853"/>
+                  <a:pt x="360000" y="360000"/>
+                </a:cubicBezTo>
+                <a:cubicBezTo>
+                  <a:pt x="360000" y="161177"/>
+                  <a:pt x="521177" y="0"/>
+                  <a:pt x="720000" y="0"/>
+                </a:cubicBezTo>
+                <a:close/>
+              </a:path>
+            </a:pathLst>
+          </a:custGeom>
+          <a:ln/>
+        </p:spPr>
+        <p:style>
+          <a:lnRef idx="2">
+            <a:schemeClr val="accent6">
+              <a:shade val="50000"/>
+            </a:schemeClr>
+          </a:lnRef>
+          <a:fillRef idx="1">
+            <a:schemeClr val="accent6"/>
+          </a:fillRef>
+          <a:effectRef idx="0">
+            <a:schemeClr val="accent6"/>
+          </a:effectRef>
+          <a:fontRef idx="minor">
+            <a:schemeClr val="lt1"/>
+          </a:fontRef>
+        </p:style>
+        <p:txBody>
+          <a:bodyPr rtlCol="0" anchor="ctr"/>
+          <a:lstStyle/>
+          <a:p>
+            <a:pPr algn="ctr"/>
+            <a:endParaRPr lang="de-DE" dirty="0">
+              <a:solidFill>
+                <a:schemeClr val="tx1"/>
+              </a:solidFill>
+            </a:endParaRPr>
+          </a:p>
+        </p:txBody>
+      </p:sp>
+      <p:sp>
+        <p:nvSpPr>
+          <p:cNvPr id="53" name="Freihandform: Form 52">
+            <a:extLst>
+              <a:ext uri="{FF2B5EF4-FFF2-40B4-BE49-F238E27FC236}">
+                <a16:creationId xmlns:a16="http://schemas.microsoft.com/office/drawing/2014/main" id="{36291A3A-3A77-4B07-819A-EB0312453CB8}"/>
+              </a:ext>
+            </a:extLst>
+          </p:cNvPr>
+          <p:cNvSpPr/>
+          <p:nvPr/>
+        </p:nvSpPr>
+        <p:spPr>
+          <a:xfrm rot="16200000">
+            <a:off x="10426211" y="3208075"/>
+            <a:ext cx="1440000" cy="1889650"/>
+          </a:xfrm>
+          <a:custGeom>
+            <a:avLst/>
+            <a:gdLst>
+              <a:gd name="connsiteX0" fmla="*/ 720000 w 1440000"/>
+              <a:gd name="connsiteY0" fmla="*/ 0 h 1889650"/>
+              <a:gd name="connsiteX1" fmla="*/ 1080000 w 1440000"/>
+              <a:gd name="connsiteY1" fmla="*/ 360000 h 1889650"/>
+              <a:gd name="connsiteX2" fmla="*/ 1072686 w 1440000"/>
+              <a:gd name="connsiteY2" fmla="*/ 432553 h 1889650"/>
+              <a:gd name="connsiteX3" fmla="*/ 1067379 w 1440000"/>
+              <a:gd name="connsiteY3" fmla="*/ 449650 h 1889650"/>
+              <a:gd name="connsiteX4" fmla="*/ 1440000 w 1440000"/>
+              <a:gd name="connsiteY4" fmla="*/ 449650 h 1889650"/>
+              <a:gd name="connsiteX5" fmla="*/ 1440000 w 1440000"/>
+              <a:gd name="connsiteY5" fmla="*/ 822271 h 1889650"/>
+              <a:gd name="connsiteX6" fmla="*/ 1422903 w 1440000"/>
+              <a:gd name="connsiteY6" fmla="*/ 816964 h 1889650"/>
+              <a:gd name="connsiteX7" fmla="*/ 1350350 w 1440000"/>
+              <a:gd name="connsiteY7" fmla="*/ 809650 h 1889650"/>
+              <a:gd name="connsiteX8" fmla="*/ 990350 w 1440000"/>
+              <a:gd name="connsiteY8" fmla="*/ 1169650 h 1889650"/>
+              <a:gd name="connsiteX9" fmla="*/ 1350350 w 1440000"/>
+              <a:gd name="connsiteY9" fmla="*/ 1529650 h 1889650"/>
+              <a:gd name="connsiteX10" fmla="*/ 1422903 w 1440000"/>
+              <a:gd name="connsiteY10" fmla="*/ 1522336 h 1889650"/>
+              <a:gd name="connsiteX11" fmla="*/ 1440000 w 1440000"/>
+              <a:gd name="connsiteY11" fmla="*/ 1517029 h 1889650"/>
+              <a:gd name="connsiteX12" fmla="*/ 1440000 w 1440000"/>
+              <a:gd name="connsiteY12" fmla="*/ 1889650 h 1889650"/>
+              <a:gd name="connsiteX13" fmla="*/ 0 w 1440000"/>
+              <a:gd name="connsiteY13" fmla="*/ 1889650 h 1889650"/>
+              <a:gd name="connsiteX14" fmla="*/ 0 w 1440000"/>
+              <a:gd name="connsiteY14" fmla="*/ 449650 h 1889650"/>
+              <a:gd name="connsiteX15" fmla="*/ 372621 w 1440000"/>
+              <a:gd name="connsiteY15" fmla="*/ 449650 h 1889650"/>
+              <a:gd name="connsiteX16" fmla="*/ 367314 w 1440000"/>
+              <a:gd name="connsiteY16" fmla="*/ 432553 h 1889650"/>
+              <a:gd name="connsiteX17" fmla="*/ 360000 w 1440000"/>
+              <a:gd name="connsiteY17" fmla="*/ 360000 h 1889650"/>
+              <a:gd name="connsiteX18" fmla="*/ 720000 w 1440000"/>
+              <a:gd name="connsiteY18" fmla="*/ 0 h 1889650"/>
+            </a:gdLst>
+            <a:ahLst/>
+            <a:cxnLst>
+              <a:cxn ang="0">
+                <a:pos x="connsiteX0" y="connsiteY0"/>
+              </a:cxn>
+              <a:cxn ang="0">
+                <a:pos x="connsiteX1" y="connsiteY1"/>
+              </a:cxn>
+              <a:cxn ang="0">
+                <a:pos x="connsiteX2" y="connsiteY2"/>
+              </a:cxn>
+              <a:cxn ang="0">
+                <a:pos x="connsiteX3" y="connsiteY3"/>
+              </a:cxn>
+              <a:cxn ang="0">
+                <a:pos x="connsiteX4" y="connsiteY4"/>
+              </a:cxn>
+              <a:cxn ang="0">
+                <a:pos x="connsiteX5" y="connsiteY5"/>
+              </a:cxn>
+              <a:cxn ang="0">
+                <a:pos x="connsiteX6" y="connsiteY6"/>
+              </a:cxn>
+              <a:cxn ang="0">
+                <a:pos x="connsiteX7" y="connsiteY7"/>
+              </a:cxn>
+              <a:cxn ang="0">
+                <a:pos x="connsiteX8" y="connsiteY8"/>
+              </a:cxn>
+              <a:cxn ang="0">
+                <a:pos x="connsiteX9" y="connsiteY9"/>
+              </a:cxn>
+              <a:cxn ang="0">
+                <a:pos x="connsiteX10" y="connsiteY10"/>
+              </a:cxn>
+              <a:cxn ang="0">
+                <a:pos x="connsiteX11" y="connsiteY11"/>
+              </a:cxn>
+              <a:cxn ang="0">
+                <a:pos x="connsiteX12" y="connsiteY12"/>
+              </a:cxn>
+              <a:cxn ang="0">
+                <a:pos x="connsiteX13" y="connsiteY13"/>
+              </a:cxn>
+              <a:cxn ang="0">
+                <a:pos x="connsiteX14" y="connsiteY14"/>
+              </a:cxn>
+              <a:cxn ang="0">
+                <a:pos x="connsiteX15" y="connsiteY15"/>
+              </a:cxn>
+              <a:cxn ang="0">
+                <a:pos x="connsiteX16" y="connsiteY16"/>
+              </a:cxn>
+              <a:cxn ang="0">
+                <a:pos x="connsiteX17" y="connsiteY17"/>
+              </a:cxn>
+              <a:cxn ang="0">
+                <a:pos x="connsiteX18" y="connsiteY18"/>
+              </a:cxn>
+            </a:cxnLst>
+            <a:rect l="l" t="t" r="r" b="b"/>
+            <a:pathLst>
+              <a:path w="1440000" h="1889650">
+                <a:moveTo>
+                  <a:pt x="720000" y="0"/>
+                </a:moveTo>
+                <a:cubicBezTo>
+                  <a:pt x="918823" y="0"/>
+                  <a:pt x="1080000" y="161177"/>
+                  <a:pt x="1080000" y="360000"/>
+                </a:cubicBezTo>
+                <a:cubicBezTo>
+                  <a:pt x="1080000" y="384853"/>
+                  <a:pt x="1077482" y="409118"/>
+                  <a:pt x="1072686" y="432553"/>
+                </a:cubicBezTo>
+                <a:lnTo>
+                  <a:pt x="1067379" y="449650"/>
+                </a:lnTo>
+                <a:lnTo>
+                  <a:pt x="1440000" y="449650"/>
+                </a:lnTo>
+                <a:lnTo>
+                  <a:pt x="1440000" y="822271"/>
+                </a:lnTo>
+                <a:lnTo>
+                  <a:pt x="1422903" y="816964"/>
+                </a:lnTo>
+                <a:cubicBezTo>
+                  <a:pt x="1399468" y="812169"/>
+                  <a:pt x="1375203" y="809650"/>
+                  <a:pt x="1350350" y="809650"/>
+                </a:cubicBezTo>
+                <a:cubicBezTo>
+                  <a:pt x="1151527" y="809650"/>
+                  <a:pt x="990350" y="970827"/>
+                  <a:pt x="990350" y="1169650"/>
+                </a:cubicBezTo>
+                <a:cubicBezTo>
+                  <a:pt x="990350" y="1368473"/>
+                  <a:pt x="1151527" y="1529650"/>
+                  <a:pt x="1350350" y="1529650"/>
+                </a:cubicBezTo>
+                <a:cubicBezTo>
+                  <a:pt x="1375203" y="1529650"/>
+                  <a:pt x="1399468" y="1527132"/>
+                  <a:pt x="1422903" y="1522336"/>
+                </a:cubicBezTo>
+                <a:lnTo>
+                  <a:pt x="1440000" y="1517029"/>
+                </a:lnTo>
+                <a:lnTo>
+                  <a:pt x="1440000" y="1889650"/>
+                </a:lnTo>
+                <a:lnTo>
+                  <a:pt x="0" y="1889650"/>
+                </a:lnTo>
+                <a:lnTo>
+                  <a:pt x="0" y="449650"/>
+                </a:lnTo>
+                <a:lnTo>
+                  <a:pt x="372621" y="449650"/>
+                </a:lnTo>
+                <a:lnTo>
+                  <a:pt x="367314" y="432553"/>
+                </a:lnTo>
+                <a:cubicBezTo>
+                  <a:pt x="362519" y="409118"/>
+                  <a:pt x="360000" y="384853"/>
+                  <a:pt x="360000" y="360000"/>
+                </a:cubicBezTo>
+                <a:cubicBezTo>
+                  <a:pt x="360000" y="161177"/>
+                  <a:pt x="521177" y="0"/>
+                  <a:pt x="720000" y="0"/>
+                </a:cubicBezTo>
+                <a:close/>
+              </a:path>
+            </a:pathLst>
+          </a:custGeom>
+          <a:ln/>
+        </p:spPr>
+        <p:style>
+          <a:lnRef idx="2">
+            <a:schemeClr val="accent4">
+              <a:shade val="50000"/>
+            </a:schemeClr>
+          </a:lnRef>
+          <a:fillRef idx="1">
+            <a:schemeClr val="accent4"/>
+          </a:fillRef>
+          <a:effectRef idx="0">
+            <a:schemeClr val="accent4"/>
+          </a:effectRef>
+          <a:fontRef idx="minor">
+            <a:schemeClr val="lt1"/>
+          </a:fontRef>
+        </p:style>
+        <p:txBody>
+          <a:bodyPr vert="vert" rtlCol="0" anchor="ctr"/>
+          <a:lstStyle/>
+          <a:p>
+            <a:pPr algn="ctr"/>
+            <a:endParaRPr lang="de-DE" dirty="0">
+              <a:solidFill>
+                <a:schemeClr val="tx1"/>
+              </a:solidFill>
+            </a:endParaRPr>
+          </a:p>
+        </p:txBody>
+      </p:sp>
+      <p:pic>
+        <p:nvPicPr>
+          <p:cNvPr id="62" name="Grafik 61" descr="Übertragen">
+            <a:extLst>
+              <a:ext uri="{FF2B5EF4-FFF2-40B4-BE49-F238E27FC236}">
+                <a16:creationId xmlns:a16="http://schemas.microsoft.com/office/drawing/2014/main" id="{577B9D71-4F8F-4EE9-830F-1F85C6316625}"/>
+              </a:ext>
+            </a:extLst>
+          </p:cNvPr>
+          <p:cNvPicPr>
+            <a:picLocks noChangeAspect="1"/>
+          </p:cNvPicPr>
+          <p:nvPr/>
+        </p:nvPicPr>
+        <p:blipFill>
+          <a:blip r:embed="rId10">
+            <a:extLst>
+              <a:ext uri="{28A0092B-C50C-407E-A947-70E740481C1C}">
+                <a14:useLocalDpi xmlns:a14="http://schemas.microsoft.com/office/drawing/2010/main" val="0"/>
+              </a:ext>
+              <a:ext uri="{96DAC541-7B7A-43D3-8B79-37D633B846F1}">
+                <asvg:svgBlip xmlns:asvg="http://schemas.microsoft.com/office/drawing/2016/SVG/main" r:embed="rId11"/>
+              </a:ext>
+            </a:extLst>
+          </a:blip>
+          <a:stretch>
+            <a:fillRect/>
+          </a:stretch>
+        </p:blipFill>
+        <p:spPr>
+          <a:xfrm>
+            <a:off x="1307330" y="5516839"/>
+            <a:ext cx="667720" cy="667720"/>
+          </a:xfrm>
+          <a:prstGeom prst="rect">
+            <a:avLst/>
+          </a:prstGeom>
+        </p:spPr>
+      </p:pic>
+      <p:pic>
+        <p:nvPicPr>
+          <p:cNvPr id="63" name="Grafik 62" descr="Entsperren">
+            <a:extLst>
+              <a:ext uri="{FF2B5EF4-FFF2-40B4-BE49-F238E27FC236}">
+                <a16:creationId xmlns:a16="http://schemas.microsoft.com/office/drawing/2014/main" id="{BD396748-421E-4685-B2E7-5F01FBBF2E46}"/>
+              </a:ext>
+            </a:extLst>
+          </p:cNvPr>
+          <p:cNvPicPr>
+            <a:picLocks noChangeAspect="1"/>
+          </p:cNvPicPr>
+          <p:nvPr/>
+        </p:nvPicPr>
+        <p:blipFill>
+          <a:blip r:embed="rId12">
+            <a:extLst>
+              <a:ext uri="{28A0092B-C50C-407E-A947-70E740481C1C}">
+                <a14:useLocalDpi xmlns:a14="http://schemas.microsoft.com/office/drawing/2010/main" val="0"/>
+              </a:ext>
+              <a:ext uri="{96DAC541-7B7A-43D3-8B79-37D633B846F1}">
+                <asvg:svgBlip xmlns:asvg="http://schemas.microsoft.com/office/drawing/2016/SVG/main" r:embed="rId13"/>
+              </a:ext>
+            </a:extLst>
+          </a:blip>
+          <a:stretch>
+            <a:fillRect/>
+          </a:stretch>
+        </p:blipFill>
+        <p:spPr>
+          <a:xfrm>
+            <a:off x="2803987" y="4143235"/>
+            <a:ext cx="582816" cy="582816"/>
+          </a:xfrm>
+          <a:prstGeom prst="rect">
+            <a:avLst/>
+          </a:prstGeom>
+        </p:spPr>
+      </p:pic>
+      <p:pic>
+        <p:nvPicPr>
+          <p:cNvPr id="64" name="Grafik 63" descr="Recycling-Schild">
+            <a:extLst>
+              <a:ext uri="{FF2B5EF4-FFF2-40B4-BE49-F238E27FC236}">
+                <a16:creationId xmlns:a16="http://schemas.microsoft.com/office/drawing/2014/main" id="{702D0ED3-765D-4D38-ADCA-26C01ACC26FA}"/>
+              </a:ext>
+            </a:extLst>
+          </p:cNvPr>
+          <p:cNvPicPr>
+            <a:picLocks noChangeAspect="1"/>
+          </p:cNvPicPr>
+          <p:nvPr/>
+        </p:nvPicPr>
+        <p:blipFill>
+          <a:blip r:embed="rId14">
+            <a:extLst>
+              <a:ext uri="{28A0092B-C50C-407E-A947-70E740481C1C}">
+                <a14:useLocalDpi xmlns:a14="http://schemas.microsoft.com/office/drawing/2010/main" val="0"/>
+              </a:ext>
+              <a:ext uri="{96DAC541-7B7A-43D3-8B79-37D633B846F1}">
+                <asvg:svgBlip xmlns:asvg="http://schemas.microsoft.com/office/drawing/2016/SVG/main" r:embed="rId15"/>
+              </a:ext>
+            </a:extLst>
+          </a:blip>
+          <a:stretch>
+            <a:fillRect/>
+          </a:stretch>
+        </p:blipFill>
+        <p:spPr>
+          <a:xfrm>
+            <a:off x="2835625" y="5590929"/>
+            <a:ext cx="519540" cy="519540"/>
+          </a:xfrm>
+          <a:prstGeom prst="rect">
+            <a:avLst/>
+          </a:prstGeom>
+        </p:spPr>
+      </p:pic>
+      <p:pic>
+        <p:nvPicPr>
+          <p:cNvPr id="65" name="Grafik 64" descr="Lupe">
+            <a:extLst>
+              <a:ext uri="{FF2B5EF4-FFF2-40B4-BE49-F238E27FC236}">
+                <a16:creationId xmlns:a16="http://schemas.microsoft.com/office/drawing/2014/main" id="{EA6F15AA-EECC-4E9B-9756-6CE6F26CBC17}"/>
+              </a:ext>
+            </a:extLst>
+          </p:cNvPr>
+          <p:cNvPicPr>
+            <a:picLocks noChangeAspect="1"/>
+          </p:cNvPicPr>
+          <p:nvPr/>
+        </p:nvPicPr>
+        <p:blipFill>
+          <a:blip r:embed="rId16">
+            <a:extLst>
+              <a:ext uri="{28A0092B-C50C-407E-A947-70E740481C1C}">
+                <a14:useLocalDpi xmlns:a14="http://schemas.microsoft.com/office/drawing/2010/main" val="0"/>
+              </a:ext>
+              <a:ext uri="{96DAC541-7B7A-43D3-8B79-37D633B846F1}">
+                <asvg:svgBlip xmlns:asvg="http://schemas.microsoft.com/office/drawing/2016/SVG/main" r:embed="rId17"/>
+              </a:ext>
+            </a:extLst>
+          </a:blip>
+          <a:stretch>
+            <a:fillRect/>
+          </a:stretch>
+        </p:blipFill>
+        <p:spPr>
+          <a:xfrm>
+            <a:off x="1444747" y="4181146"/>
+            <a:ext cx="506994" cy="506994"/>
+          </a:xfrm>
+          <a:prstGeom prst="rect">
+            <a:avLst/>
+          </a:prstGeom>
+        </p:spPr>
+      </p:pic>
+    </p:spTree>
+    <p:extLst>
+      <p:ext uri="{BB962C8B-B14F-4D97-AF65-F5344CB8AC3E}">
+        <p14:creationId xmlns:p14="http://schemas.microsoft.com/office/powerpoint/2010/main" val="1645873096"/>
+      </p:ext>
+    </p:extLst>
+  </p:cSld>
+  <p:clrMapOvr>
+    <a:masterClrMapping/>
+  </p:clrMapOvr>
+</p:sld>
+</file>
+
+<file path=ppt/slides/slide8.xml><?xml version="1.0" encoding="utf-8"?>
+<p:sld xmlns:a="http://schemas.openxmlformats.org/drawingml/2006/main" xmlns:r="http://schemas.openxmlformats.org/officeDocument/2006/relationships" xmlns:p="http://schemas.openxmlformats.org/presentationml/2006/main">
+  <p:cSld>
+    <p:spTree>
+      <p:nvGrpSpPr>
+        <p:cNvPr id="1" name=""/>
+        <p:cNvGrpSpPr/>
+        <p:nvPr/>
+      </p:nvGrpSpPr>
+      <p:grpSpPr>
+        <a:xfrm>
+          <a:off x="0" y="0"/>
+          <a:ext cx="0" cy="0"/>
+          <a:chOff x="0" y="0"/>
+          <a:chExt cx="0" cy="0"/>
+        </a:xfrm>
+      </p:grpSpPr>
+      <p:sp>
+        <p:nvSpPr>
           <p:cNvPr id="2" name="Titel 1">
             <a:extLst>
               <a:ext uri="{FF2B5EF4-FFF2-40B4-BE49-F238E27FC236}">
@@ -39248,7 +41768,7 @@
 </p:sld>
 </file>
 
-<file path=ppt/slides/slide8.xml><?xml version="1.0" encoding="utf-8"?>
+<file path=ppt/slides/slide9.xml><?xml version="1.0" encoding="utf-8"?>
 <p:sld xmlns:a="http://schemas.openxmlformats.org/drawingml/2006/main" xmlns:r="http://schemas.openxmlformats.org/officeDocument/2006/relationships" xmlns:p="http://schemas.openxmlformats.org/presentationml/2006/main">
   <p:cSld>
     <p:spTree>
@@ -39382,196 +41902,6 @@
     <p:extLst>
       <p:ext uri="{BB962C8B-B14F-4D97-AF65-F5344CB8AC3E}">
         <p14:creationId xmlns:p14="http://schemas.microsoft.com/office/powerpoint/2010/main" val="1071444481"/>
-      </p:ext>
-    </p:extLst>
-  </p:cSld>
-  <p:clrMapOvr>
-    <a:masterClrMapping/>
-  </p:clrMapOvr>
-</p:sld>
-</file>
-
-<file path=ppt/slides/slide9.xml><?xml version="1.0" encoding="utf-8"?>
-<p:sld xmlns:a="http://schemas.openxmlformats.org/drawingml/2006/main" xmlns:r="http://schemas.openxmlformats.org/officeDocument/2006/relationships" xmlns:p="http://schemas.openxmlformats.org/presentationml/2006/main">
-  <p:cSld>
-    <p:spTree>
-      <p:nvGrpSpPr>
-        <p:cNvPr id="1" name=""/>
-        <p:cNvGrpSpPr/>
-        <p:nvPr/>
-      </p:nvGrpSpPr>
-      <p:grpSpPr>
-        <a:xfrm>
-          <a:off x="0" y="0"/>
-          <a:ext cx="0" cy="0"/>
-          <a:chOff x="0" y="0"/>
-          <a:chExt cx="0" cy="0"/>
-        </a:xfrm>
-      </p:grpSpPr>
-      <p:sp>
-        <p:nvSpPr>
-          <p:cNvPr id="2" name="Titel 1">
-            <a:extLst>
-              <a:ext uri="{FF2B5EF4-FFF2-40B4-BE49-F238E27FC236}">
-                <a16:creationId xmlns:a16="http://schemas.microsoft.com/office/drawing/2014/main" id="{0B6C9755-5CEB-444E-8AE8-3FCA3E65367F}"/>
-              </a:ext>
-            </a:extLst>
-          </p:cNvPr>
-          <p:cNvSpPr>
-            <a:spLocks noGrp="1"/>
-          </p:cNvSpPr>
-          <p:nvPr>
-            <p:ph type="title"/>
-          </p:nvPr>
-        </p:nvSpPr>
-        <p:spPr>
-          <a:xfrm>
-            <a:off x="838200" y="365125"/>
-            <a:ext cx="10515600" cy="1325563"/>
-          </a:xfrm>
-        </p:spPr>
-        <p:txBody>
-          <a:bodyPr/>
-          <a:lstStyle/>
-          <a:p>
-            <a:r>
-              <a:rPr lang="de-DE" dirty="0"/>
-              <a:t>Problem Statement</a:t>
-            </a:r>
-          </a:p>
-        </p:txBody>
-      </p:sp>
-      <p:sp>
-        <p:nvSpPr>
-          <p:cNvPr id="3" name="Inhaltsplatzhalter 2">
-            <a:extLst>
-              <a:ext uri="{FF2B5EF4-FFF2-40B4-BE49-F238E27FC236}">
-                <a16:creationId xmlns:a16="http://schemas.microsoft.com/office/drawing/2014/main" id="{137375D5-F574-4589-B859-C4338E397C0A}"/>
-              </a:ext>
-            </a:extLst>
-          </p:cNvPr>
-          <p:cNvSpPr>
-            <a:spLocks noGrp="1"/>
-          </p:cNvSpPr>
-          <p:nvPr>
-            <p:ph idx="1"/>
-          </p:nvPr>
-        </p:nvSpPr>
-        <p:spPr/>
-        <p:txBody>
-          <a:bodyPr/>
-          <a:lstStyle/>
-          <a:p>
-            <a:r>
-              <a:rPr lang="de-DE" dirty="0" err="1"/>
-              <a:t>Luenberger</a:t>
-            </a:r>
-            <a:r>
-              <a:rPr lang="de-DE" dirty="0"/>
-              <a:t> Beobachter</a:t>
-            </a:r>
-          </a:p>
-          <a:p>
-            <a:r>
-              <a:rPr lang="de-DE" dirty="0"/>
-              <a:t>Grey: </a:t>
-            </a:r>
-            <a:r>
-              <a:rPr lang="de-DE" dirty="0" err="1"/>
-              <a:t>state</a:t>
-            </a:r>
-            <a:r>
-              <a:rPr lang="de-DE" dirty="0"/>
-              <a:t>, </a:t>
-            </a:r>
-            <a:r>
-              <a:rPr lang="de-DE" dirty="0" err="1"/>
-              <a:t>red</a:t>
-            </a:r>
-            <a:r>
-              <a:rPr lang="de-DE" dirty="0"/>
-              <a:t>: </a:t>
-            </a:r>
-            <a:r>
-              <a:rPr lang="de-DE" dirty="0" err="1"/>
-              <a:t>sensor</a:t>
-            </a:r>
-            <a:r>
-              <a:rPr lang="de-DE" dirty="0"/>
-              <a:t> </a:t>
-            </a:r>
-            <a:r>
-              <a:rPr lang="de-DE" dirty="0" err="1"/>
-              <a:t>value</a:t>
-            </a:r>
-            <a:endParaRPr lang="de-DE" dirty="0"/>
-          </a:p>
-        </p:txBody>
-      </p:sp>
-      <p:pic>
-        <p:nvPicPr>
-          <p:cNvPr id="15" name="Grafik 14">
-            <a:extLst>
-              <a:ext uri="{FF2B5EF4-FFF2-40B4-BE49-F238E27FC236}">
-                <a16:creationId xmlns:a16="http://schemas.microsoft.com/office/drawing/2014/main" id="{71CE78D1-B116-44BE-8B7E-B9D00F3B4F22}"/>
-              </a:ext>
-            </a:extLst>
-          </p:cNvPr>
-          <p:cNvPicPr>
-            <a:picLocks noChangeAspect="1"/>
-          </p:cNvPicPr>
-          <p:nvPr/>
-        </p:nvPicPr>
-        <p:blipFill>
-          <a:blip r:embed="rId2"/>
-          <a:stretch>
-            <a:fillRect/>
-          </a:stretch>
-        </p:blipFill>
-        <p:spPr>
-          <a:xfrm>
-            <a:off x="7296955" y="1561216"/>
-            <a:ext cx="3317865" cy="1479727"/>
-          </a:xfrm>
-          <a:prstGeom prst="rect">
-            <a:avLst/>
-          </a:prstGeom>
-        </p:spPr>
-      </p:pic>
-      <p:pic>
-        <p:nvPicPr>
-          <p:cNvPr id="4" name="Grafik 3">
-            <a:extLst>
-              <a:ext uri="{FF2B5EF4-FFF2-40B4-BE49-F238E27FC236}">
-                <a16:creationId xmlns:a16="http://schemas.microsoft.com/office/drawing/2014/main" id="{5AAD4701-7572-4896-A3F8-B7DBC1196B21}"/>
-              </a:ext>
-            </a:extLst>
-          </p:cNvPr>
-          <p:cNvPicPr>
-            <a:picLocks noChangeAspect="1"/>
-          </p:cNvPicPr>
-          <p:nvPr/>
-        </p:nvPicPr>
-        <p:blipFill>
-          <a:blip r:embed="rId3"/>
-          <a:stretch>
-            <a:fillRect/>
-          </a:stretch>
-        </p:blipFill>
-        <p:spPr>
-          <a:xfrm>
-            <a:off x="7100914" y="3252083"/>
-            <a:ext cx="3709946" cy="2460442"/>
-          </a:xfrm>
-          <a:prstGeom prst="rect">
-            <a:avLst/>
-          </a:prstGeom>
-        </p:spPr>
-      </p:pic>
-    </p:spTree>
-    <p:extLst>
-      <p:ext uri="{BB962C8B-B14F-4D97-AF65-F5344CB8AC3E}">
-        <p14:creationId xmlns:p14="http://schemas.microsoft.com/office/powerpoint/2010/main" val="3603659497"/>
       </p:ext>
     </p:extLst>
   </p:cSld>

</xml_diff>

<commit_message>
safety commit nach der Zeche. Bilder fertig beschriftet
</commit_message>
<xml_diff>
--- a/scratch.pptx
+++ b/scratch.pptx
@@ -12116,7 +12116,10 @@
             <a:rPr lang="de-DE" dirty="0" err="1"/>
             <a:t>Component</a:t>
           </a:r>
-          <a:endParaRPr lang="de-DE" dirty="0"/>
+          <a:r>
+            <a:rPr lang="de-DE" dirty="0"/>
+            <a:t> 1</a:t>
+          </a:r>
         </a:p>
       </dgm:t>
     </dgm:pt>
@@ -12296,7 +12299,7 @@
         <a:p>
           <a:r>
             <a:rPr lang="de-DE" dirty="0"/>
-            <a:t>Tag</a:t>
+            <a:t>Tag 1</a:t>
           </a:r>
         </a:p>
       </dgm:t>
@@ -24461,7 +24464,7 @@
           </a:pPr>
           <a:r>
             <a:rPr lang="de-DE" sz="1200" kern="1200" dirty="0"/>
-            <a:t>Tag</a:t>
+            <a:t>Tag 1</a:t>
           </a:r>
         </a:p>
       </dsp:txBody>
@@ -24893,7 +24896,10 @@
             <a:rPr lang="de-DE" sz="1200" kern="1200" dirty="0" err="1"/>
             <a:t>Component</a:t>
           </a:r>
-          <a:endParaRPr lang="de-DE" sz="1200" kern="1200" dirty="0"/>
+          <a:r>
+            <a:rPr lang="de-DE" sz="1200" kern="1200" dirty="0"/>
+            <a:t> 1</a:t>
+          </a:r>
         </a:p>
       </dsp:txBody>
       <dsp:txXfrm>
@@ -43515,7 +43521,7 @@
             <p:ph idx="1"/>
             <p:extLst>
               <p:ext uri="{D42A27DB-BD31-4B8C-83A1-F6EECF244321}">
-                <p14:modId xmlns:p14="http://schemas.microsoft.com/office/powerpoint/2010/main" val="3049412664"/>
+                <p14:modId xmlns:p14="http://schemas.microsoft.com/office/powerpoint/2010/main" val="1491486838"/>
               </p:ext>
             </p:extLst>
           </p:nvPr>

</xml_diff>